<commit_message>
Updating slides. Addign figures
</commit_message>
<xml_diff>
--- a/2018-03-14_UCSF_workshop/slides/2018-03-14_13_UCSF_Class-Project.pptx
+++ b/2018-03-14_UCSF_workshop/slides/2018-03-14_13_UCSF_Class-Project.pptx
@@ -9,8 +9,8 @@
   </p:notesMasterIdLst>
   <p:sldIdLst>
     <p:sldId id="263" r:id="rId4"/>
-    <p:sldId id="265" r:id="rId5"/>
-    <p:sldId id="264" r:id="rId6"/>
+    <p:sldId id="266" r:id="rId5"/>
+    <p:sldId id="267" r:id="rId6"/>
   </p:sldIdLst>
   <p:sldSz cx="9144000" cy="6858000" type="screen4x3"/>
   <p:notesSz cx="6858000" cy="9144000"/>
@@ -261,7 +261,7 @@
             <a:fld id="{1FB47176-3508-F043-9A05-F514E844DBE7}" type="datetime1">
               <a:rPr lang="en-US"/>
               <a:pPr/>
-              <a:t>2/22/18</a:t>
+              <a:t>3/11/18</a:t>
             </a:fld>
             <a:endParaRPr lang="en-US"/>
           </a:p>
@@ -1199,6 +1199,59 @@
                 <a:cs typeface="Arial" charset="0"/>
                 <a:sym typeface="Arial" charset="0"/>
               </a:rPr>
+              <a:t>Any time you perform</a:t>
+            </a:r>
+            <a:r>
+              <a:rPr lang="en-US" sz="1600" baseline="0" dirty="0">
+                <a:solidFill>
+                  <a:srgbClr val="000000"/>
+                </a:solidFill>
+                <a:latin typeface="Arial" charset="0"/>
+                <a:cs typeface="Arial" charset="0"/>
+                <a:sym typeface="Arial" charset="0"/>
+              </a:rPr>
+              <a:t> a statistical analysis, you need to make assumptions on the underlying data. In this short project we will observe what happens when making </a:t>
+            </a:r>
+            <a:r>
+              <a:rPr lang="en-US" sz="1600" baseline="0">
+                <a:solidFill>
+                  <a:srgbClr val="000000"/>
+                </a:solidFill>
+                <a:latin typeface="Arial" charset="0"/>
+                <a:cs typeface="Arial" charset="0"/>
+                <a:sym typeface="Arial" charset="0"/>
+              </a:rPr>
+              <a:t>different assumptions on the data.</a:t>
+            </a:r>
+            <a:endParaRPr lang="en-US" sz="1600" dirty="0">
+              <a:solidFill>
+                <a:srgbClr val="000000"/>
+              </a:solidFill>
+              <a:latin typeface="Arial" charset="0"/>
+              <a:cs typeface="Arial" charset="0"/>
+              <a:sym typeface="Arial" charset="0"/>
+            </a:endParaRPr>
+          </a:p>
+          <a:p>
+            <a:endParaRPr lang="en-US" sz="1600" dirty="0">
+              <a:solidFill>
+                <a:srgbClr val="000000"/>
+              </a:solidFill>
+              <a:latin typeface="Arial" charset="0"/>
+              <a:cs typeface="Arial" charset="0"/>
+              <a:sym typeface="Arial" charset="0"/>
+            </a:endParaRPr>
+          </a:p>
+          <a:p>
+            <a:r>
+              <a:rPr lang="en-US" sz="1600" dirty="0">
+                <a:solidFill>
+                  <a:srgbClr val="000000"/>
+                </a:solidFill>
+                <a:latin typeface="Arial" charset="0"/>
+                <a:cs typeface="Arial" charset="0"/>
+                <a:sym typeface="Arial" charset="0"/>
+              </a:rPr>
               <a:t>Shortly, </a:t>
             </a:r>
             <a:r>
@@ -1283,15 +1336,7 @@
                 <a:ea typeface="PT Sans" charset="-52"/>
                 <a:cs typeface="PT Sans" charset="-52"/>
               </a:rPr>
-              <a:t> generated by </a:t>
-            </a:r>
-            <a:r>
-              <a:rPr lang="en-US" sz="1600" baseline="0">
-                <a:latin typeface="PT Sans" charset="-52"/>
-                <a:ea typeface="PT Sans" charset="-52"/>
-                <a:cs typeface="PT Sans" charset="-52"/>
-              </a:rPr>
-              <a:t>those models.</a:t>
+              <a:t> generated by those models.</a:t>
             </a:r>
             <a:endParaRPr lang="en-US" sz="1600" dirty="0">
               <a:latin typeface="PT Sans" charset="-52"/>
@@ -1400,7 +1445,7 @@
     </p:spTree>
     <p:extLst>
       <p:ext uri="{BB962C8B-B14F-4D97-AF65-F5344CB8AC3E}">
-        <p14:creationId xmlns:p14="http://schemas.microsoft.com/office/powerpoint/2010/main" val="722732978"/>
+        <p14:creationId xmlns:p14="http://schemas.microsoft.com/office/powerpoint/2010/main" val="1113953364"/>
       </p:ext>
     </p:extLst>
   </p:cSld>
@@ -1591,6 +1636,59 @@
                 <a:cs typeface="Arial" charset="0"/>
                 <a:sym typeface="Arial" charset="0"/>
               </a:rPr>
+              <a:t>Any time you perform</a:t>
+            </a:r>
+            <a:r>
+              <a:rPr lang="en-US" sz="1600" baseline="0" dirty="0">
+                <a:solidFill>
+                  <a:srgbClr val="000000"/>
+                </a:solidFill>
+                <a:latin typeface="Arial" charset="0"/>
+                <a:cs typeface="Arial" charset="0"/>
+                <a:sym typeface="Arial" charset="0"/>
+              </a:rPr>
+              <a:t> a statistical analysis, you need to make assumptions on the underlying data. In this short project we will observe what happens when making </a:t>
+            </a:r>
+            <a:r>
+              <a:rPr lang="en-US" sz="1600" baseline="0">
+                <a:solidFill>
+                  <a:srgbClr val="000000"/>
+                </a:solidFill>
+                <a:latin typeface="Arial" charset="0"/>
+                <a:cs typeface="Arial" charset="0"/>
+                <a:sym typeface="Arial" charset="0"/>
+              </a:rPr>
+              <a:t>different assumptions on the data.</a:t>
+            </a:r>
+            <a:endParaRPr lang="en-US" sz="1600" dirty="0">
+              <a:solidFill>
+                <a:srgbClr val="000000"/>
+              </a:solidFill>
+              <a:latin typeface="Arial" charset="0"/>
+              <a:cs typeface="Arial" charset="0"/>
+              <a:sym typeface="Arial" charset="0"/>
+            </a:endParaRPr>
+          </a:p>
+          <a:p>
+            <a:endParaRPr lang="en-US" sz="1600" dirty="0">
+              <a:solidFill>
+                <a:srgbClr val="000000"/>
+              </a:solidFill>
+              <a:latin typeface="Arial" charset="0"/>
+              <a:cs typeface="Arial" charset="0"/>
+              <a:sym typeface="Arial" charset="0"/>
+            </a:endParaRPr>
+          </a:p>
+          <a:p>
+            <a:r>
+              <a:rPr lang="en-US" sz="1600" dirty="0">
+                <a:solidFill>
+                  <a:srgbClr val="000000"/>
+                </a:solidFill>
+                <a:latin typeface="Arial" charset="0"/>
+                <a:cs typeface="Arial" charset="0"/>
+                <a:sym typeface="Arial" charset="0"/>
+              </a:rPr>
               <a:t>Shortly, </a:t>
             </a:r>
             <a:r>
@@ -1675,15 +1773,7 @@
                 <a:ea typeface="PT Sans" charset="-52"/>
                 <a:cs typeface="PT Sans" charset="-52"/>
               </a:rPr>
-              <a:t> generated by </a:t>
-            </a:r>
-            <a:r>
-              <a:rPr lang="en-US" sz="1600" baseline="0">
-                <a:latin typeface="PT Sans" charset="-52"/>
-                <a:ea typeface="PT Sans" charset="-52"/>
-                <a:cs typeface="PT Sans" charset="-52"/>
-              </a:rPr>
-              <a:t>those models.</a:t>
+              <a:t> generated by those models.</a:t>
             </a:r>
             <a:endParaRPr lang="en-US" sz="1600" dirty="0">
               <a:latin typeface="PT Sans" charset="-52"/>
@@ -1792,7 +1882,7 @@
     </p:spTree>
     <p:extLst>
       <p:ext uri="{BB962C8B-B14F-4D97-AF65-F5344CB8AC3E}">
-        <p14:creationId xmlns:p14="http://schemas.microsoft.com/office/powerpoint/2010/main" val="1319604193"/>
+        <p14:creationId xmlns:p14="http://schemas.microsoft.com/office/powerpoint/2010/main" val="508839052"/>
       </p:ext>
     </p:extLst>
   </p:cSld>
@@ -1986,7 +2076,7 @@
             <a:fld id="{E7992B31-9780-3549-8418-C5F750288032}" type="datetime1">
               <a:rPr lang="en-US"/>
               <a:pPr/>
-              <a:t>2/22/18</a:t>
+              <a:t>3/11/18</a:t>
             </a:fld>
             <a:endParaRPr lang="en-US"/>
           </a:p>
@@ -2171,7 +2261,7 @@
             <a:fld id="{74BCDB0D-F299-9649-9691-BACA0DB3208F}" type="datetime1">
               <a:rPr lang="en-US"/>
               <a:pPr/>
-              <a:t>2/22/18</a:t>
+              <a:t>3/11/18</a:t>
             </a:fld>
             <a:endParaRPr lang="en-US"/>
           </a:p>
@@ -2366,7 +2456,7 @@
             <a:fld id="{5474A546-6B4E-1D47-9521-2DB6F5D5DAAF}" type="datetime1">
               <a:rPr lang="en-US"/>
               <a:pPr/>
-              <a:t>2/22/18</a:t>
+              <a:t>3/11/18</a:t>
             </a:fld>
             <a:endParaRPr lang="en-US"/>
           </a:p>
@@ -7894,7 +7984,7 @@
             <a:fld id="{B2934F49-9E9E-C541-8D27-5BBD2E78F3FD}" type="datetime1">
               <a:rPr lang="en-US"/>
               <a:pPr/>
-              <a:t>2/22/18</a:t>
+              <a:t>3/11/18</a:t>
             </a:fld>
             <a:endParaRPr lang="en-US"/>
           </a:p>
@@ -8156,7 +8246,7 @@
             <a:fld id="{EEE0E933-D934-3E43-9FAE-2BF54A7C673F}" type="datetime1">
               <a:rPr lang="en-US"/>
               <a:pPr/>
-              <a:t>2/22/18</a:t>
+              <a:t>3/11/18</a:t>
             </a:fld>
             <a:endParaRPr lang="en-US"/>
           </a:p>
@@ -8458,7 +8548,7 @@
             <a:fld id="{7F0127E9-6944-1846-BB9D-F0304912D1A0}" type="datetime1">
               <a:rPr lang="en-US"/>
               <a:pPr/>
-              <a:t>2/22/18</a:t>
+              <a:t>3/11/18</a:t>
             </a:fld>
             <a:endParaRPr lang="en-US"/>
           </a:p>
@@ -8894,7 +8984,7 @@
             <a:fld id="{1B866064-0D55-DA49-9CA2-926DEC814374}" type="datetime1">
               <a:rPr lang="en-US"/>
               <a:pPr/>
-              <a:t>2/22/18</a:t>
+              <a:t>3/11/18</a:t>
             </a:fld>
             <a:endParaRPr lang="en-US"/>
           </a:p>
@@ -9028,7 +9118,7 @@
             <a:fld id="{C7C8E753-86E1-2043-AD57-B577910DFE86}" type="datetime1">
               <a:rPr lang="en-US"/>
               <a:pPr/>
-              <a:t>2/22/18</a:t>
+              <a:t>3/11/18</a:t>
             </a:fld>
             <a:endParaRPr lang="en-US"/>
           </a:p>
@@ -9140,7 +9230,7 @@
             <a:fld id="{39FB9181-6EF3-2C4F-8DE8-2102CA51DE88}" type="datetime1">
               <a:rPr lang="en-US"/>
               <a:pPr/>
-              <a:t>2/22/18</a:t>
+              <a:t>3/11/18</a:t>
             </a:fld>
             <a:endParaRPr lang="en-US"/>
           </a:p>
@@ -9432,7 +9522,7 @@
             <a:fld id="{79EA2B60-0D74-A14B-9518-384BDFF9AE59}" type="datetime1">
               <a:rPr lang="en-US"/>
               <a:pPr/>
-              <a:t>2/22/18</a:t>
+              <a:t>3/11/18</a:t>
             </a:fld>
             <a:endParaRPr lang="en-US"/>
           </a:p>
@@ -9704,7 +9794,7 @@
             <a:fld id="{6CFA3747-B7B5-684C-AAE8-B80DA2D1BCC3}" type="datetime1">
               <a:rPr lang="en-US"/>
               <a:pPr/>
-              <a:t>2/22/18</a:t>
+              <a:t>3/11/18</a:t>
             </a:fld>
             <a:endParaRPr lang="en-US"/>
           </a:p>
@@ -9991,7 +10081,7 @@
             <a:fld id="{B8581DD2-8FF9-4D49-9B89-3CEE2801C92B}" type="datetime1">
               <a:rPr lang="en-US"/>
               <a:pPr/>
-              <a:t>2/22/18</a:t>
+              <a:t>3/11/18</a:t>
             </a:fld>
             <a:endParaRPr lang="en-US"/>
           </a:p>
@@ -10532,6 +10622,7 @@
           <a:ln>
             <a:noFill/>
           </a:ln>
+          <a:effectLst/>
         </p:spPr>
         <p:txBody>
           <a:bodyPr lIns="0" tIns="0" rIns="0" bIns="0" anchor="ctr"/>
@@ -10545,7 +10636,7 @@
               <a:defRPr/>
             </a:pPr>
             <a:r>
-              <a:rPr lang="en-US" sz="2800" b="1">
+              <a:rPr lang="en-US" sz="2800" b="1" dirty="0">
                 <a:solidFill>
                   <a:srgbClr val="050505"/>
                 </a:solidFill>
@@ -10554,19 +10645,7 @@
                 <a:cs typeface="PT Serif" charset="0"/>
                 <a:sym typeface="Arial"/>
               </a:rPr>
-              <a:t>Analyzing HTSeq </a:t>
-            </a:r>
-            <a:r>
-              <a:rPr lang="en-US" sz="2800" b="1" dirty="0">
-                <a:solidFill>
-                  <a:srgbClr val="050505"/>
-                </a:solidFill>
-                <a:latin typeface="PT Serif" charset="0"/>
-                <a:ea typeface="PT Serif" charset="0"/>
-                <a:cs typeface="PT Serif" charset="0"/>
-                <a:sym typeface="Arial"/>
-              </a:rPr>
-              <a:t>Data Using GenePattern</a:t>
+              <a:t>Analyzing HTSeq Data Using GenePattern</a:t>
             </a:r>
           </a:p>
         </p:txBody>
@@ -10638,27 +10717,18 @@
             <a:off x="1424024" y="1396434"/>
             <a:ext cx="2377440" cy="640080"/>
           </a:xfrm>
-          <a:prstGeom prst="rect">
+          <a:prstGeom prst="roundRect">
             <a:avLst/>
           </a:prstGeom>
           <a:solidFill>
-            <a:schemeClr val="tx2">
-              <a:lumMod val="20000"/>
-              <a:lumOff val="80000"/>
-            </a:schemeClr>
+            <a:srgbClr val="FFFF00"/>
           </a:solidFill>
-          <a:ln>
+          <a:ln w="12700">
             <a:solidFill>
               <a:srgbClr val="4A7EBB"/>
             </a:solidFill>
           </a:ln>
-          <a:effectLst>
-            <a:outerShdw blurRad="63500" dist="38182" dir="2700000" rotWithShape="0">
-              <a:srgbClr val="000000">
-                <a:alpha val="39999"/>
-              </a:srgbClr>
-            </a:outerShdw>
-          </a:effectLst>
+          <a:effectLst/>
           <a:extLst>
             <a:ext uri="{91240B29-F687-4f45-9708-019B960494DF}">
               <a14:hiddenLine xmlns="" xmlns:a14="http://schemas.microsoft.com/office/drawing/2010/main" w="9525">
@@ -10673,7 +10743,7 @@
           </a:extLst>
         </p:spPr>
         <p:txBody>
-          <a:bodyPr lIns="81638" tIns="42452" rIns="81638" bIns="42452" anchor="ctr"/>
+          <a:bodyPr lIns="0" tIns="0" rIns="0" bIns="0" anchor="ctr"/>
           <a:lstStyle/>
           <a:p>
             <a:pPr algn="ctr" eaLnBrk="1" hangingPunct="1">
@@ -10684,7 +10754,7 @@
               <a:defRPr/>
             </a:pPr>
             <a:r>
-              <a:rPr lang="en-US" sz="1300" i="1" dirty="0">
+              <a:rPr lang="en-US" sz="1300" dirty="0">
                 <a:solidFill>
                   <a:srgbClr val="000000"/>
                 </a:solidFill>
@@ -10693,29 +10763,8 @@
                 <a:cs typeface="PT Sans" charset="-52"/>
                 <a:sym typeface="Arial"/>
               </a:rPr>
-              <a:t>Load a file to </a:t>
-            </a:r>
-            <a:r>
-              <a:rPr lang="en-US" sz="1300" i="1">
-                <a:solidFill>
-                  <a:srgbClr val="000000"/>
-                </a:solidFill>
-                <a:latin typeface="PT Sans" charset="-52"/>
-                <a:ea typeface="PT Sans" charset="-52"/>
-                <a:cs typeface="PT Sans" charset="-52"/>
-                <a:sym typeface="Arial"/>
-              </a:rPr>
-              <a:t>be easily accessible</a:t>
-            </a:r>
-            <a:endParaRPr lang="en-US" sz="1300" i="1" dirty="0">
-              <a:solidFill>
-                <a:srgbClr val="000000"/>
-              </a:solidFill>
-              <a:latin typeface="PT Sans" charset="-52"/>
-              <a:ea typeface="PT Sans" charset="-52"/>
-              <a:cs typeface="PT Sans" charset="-52"/>
-              <a:sym typeface="Arial"/>
-            </a:endParaRPr>
+              <a:t>Load a file to be easily accessible</a:t>
+            </a:r>
           </a:p>
           <a:p>
             <a:pPr algn="ctr" eaLnBrk="1" hangingPunct="1">
@@ -10742,7 +10791,7 @@
       </p:sp>
       <p:sp>
         <p:nvSpPr>
-          <p:cNvPr id="34" name="Rectangle 33"/>
+          <p:cNvPr id="34" name="Rounded Rectangle 33"/>
           <p:cNvSpPr>
             <a:spLocks noChangeArrowheads="1"/>
           </p:cNvSpPr>
@@ -10753,30 +10802,22 @@
             <a:off x="5096530" y="2242804"/>
             <a:ext cx="2560320" cy="457200"/>
           </a:xfrm>
-          <a:prstGeom prst="rect">
+          <a:prstGeom prst="roundRect">
             <a:avLst/>
           </a:prstGeom>
-          <a:solidFill>
-            <a:srgbClr val="FFFF00"/>
-          </a:solidFill>
-          <a:ln w="9525">
+          <a:noFill/>
+          <a:ln w="12700">
             <a:solidFill>
-              <a:srgbClr val="4A7EBB"/>
+              <a:schemeClr val="tx1"/>
             </a:solidFill>
             <a:miter lim="800000"/>
             <a:headEnd/>
             <a:tailEnd/>
           </a:ln>
-          <a:effectLst>
-            <a:outerShdw blurRad="40000" dist="23000" dir="5400000" rotWithShape="0">
-              <a:srgbClr val="000000">
-                <a:alpha val="34999"/>
-              </a:srgbClr>
-            </a:outerShdw>
-          </a:effectLst>
+          <a:effectLst/>
         </p:spPr>
         <p:txBody>
-          <a:bodyPr anchor="ctr"/>
+          <a:bodyPr lIns="0" tIns="0" rIns="0" bIns="0" anchor="ctr"/>
           <a:lstStyle/>
           <a:p>
             <a:pPr algn="ctr" eaLnBrk="1" hangingPunct="1"/>
@@ -10804,7 +10845,7 @@
       </p:sp>
       <p:sp>
         <p:nvSpPr>
-          <p:cNvPr id="35" name="Rectangle 34"/>
+          <p:cNvPr id="35" name="Rounded Rectangle 34"/>
           <p:cNvSpPr>
             <a:spLocks noChangeArrowheads="1"/>
           </p:cNvSpPr>
@@ -10815,30 +10856,22 @@
             <a:off x="5096531" y="732945"/>
             <a:ext cx="2560320" cy="457200"/>
           </a:xfrm>
-          <a:prstGeom prst="rect">
+          <a:prstGeom prst="roundRect">
             <a:avLst/>
           </a:prstGeom>
-          <a:solidFill>
-            <a:srgbClr val="FFFF00"/>
-          </a:solidFill>
-          <a:ln w="9525">
+          <a:noFill/>
+          <a:ln w="12700">
             <a:solidFill>
-              <a:srgbClr val="4A7EBB"/>
+              <a:schemeClr val="tx1"/>
             </a:solidFill>
             <a:miter lim="800000"/>
             <a:headEnd/>
             <a:tailEnd/>
           </a:ln>
-          <a:effectLst>
-            <a:outerShdw blurRad="40000" dist="23000" dir="5400000" rotWithShape="0">
-              <a:srgbClr val="000000">
-                <a:alpha val="34999"/>
-              </a:srgbClr>
-            </a:outerShdw>
-          </a:effectLst>
+          <a:effectLst/>
         </p:spPr>
         <p:txBody>
-          <a:bodyPr anchor="ctr"/>
+          <a:bodyPr lIns="0" tIns="0" rIns="0" bIns="0" anchor="ctr"/>
           <a:lstStyle/>
           <a:p>
             <a:pPr algn="ctr" eaLnBrk="1" hangingPunct="1">
@@ -10870,7 +10903,7 @@
       </p:sp>
       <p:sp>
         <p:nvSpPr>
-          <p:cNvPr id="38" name="Rectangle 37"/>
+          <p:cNvPr id="38" name="Rounded Rectangle 37"/>
           <p:cNvSpPr>
             <a:spLocks noChangeArrowheads="1"/>
           </p:cNvSpPr>
@@ -10881,30 +10914,22 @@
             <a:off x="1424026" y="731389"/>
             <a:ext cx="2377440" cy="457200"/>
           </a:xfrm>
-          <a:prstGeom prst="rect">
+          <a:prstGeom prst="roundRect">
             <a:avLst/>
           </a:prstGeom>
-          <a:solidFill>
-            <a:srgbClr val="FFFF00"/>
-          </a:solidFill>
-          <a:ln w="9525">
+          <a:noFill/>
+          <a:ln w="12700">
             <a:solidFill>
-              <a:srgbClr val="4A7EBB"/>
+              <a:schemeClr val="tx1"/>
             </a:solidFill>
             <a:miter lim="800000"/>
             <a:headEnd/>
             <a:tailEnd/>
           </a:ln>
-          <a:effectLst>
-            <a:outerShdw blurRad="40000" dist="23000" dir="5400000" rotWithShape="0">
-              <a:srgbClr val="000000">
-                <a:alpha val="34999"/>
-              </a:srgbClr>
-            </a:outerShdw>
-          </a:effectLst>
+          <a:effectLst/>
         </p:spPr>
         <p:txBody>
-          <a:bodyPr anchor="ctr"/>
+          <a:bodyPr lIns="0" tIns="0" rIns="0" bIns="0" anchor="ctr"/>
           <a:lstStyle/>
           <a:p>
             <a:pPr algn="ctr" eaLnBrk="1" hangingPunct="1">
@@ -10947,27 +10972,18 @@
             <a:off x="5096530" y="1396434"/>
             <a:ext cx="2560320" cy="640080"/>
           </a:xfrm>
-          <a:prstGeom prst="rect">
+          <a:prstGeom prst="roundRect">
             <a:avLst/>
           </a:prstGeom>
           <a:solidFill>
-            <a:schemeClr val="tx2">
-              <a:lumMod val="20000"/>
-              <a:lumOff val="80000"/>
-            </a:schemeClr>
+            <a:srgbClr val="FFFF00"/>
           </a:solidFill>
-          <a:ln>
+          <a:ln w="12700">
             <a:solidFill>
               <a:srgbClr val="4A7EBB"/>
             </a:solidFill>
           </a:ln>
-          <a:effectLst>
-            <a:outerShdw blurRad="63500" dist="38182" dir="2700000" rotWithShape="0">
-              <a:srgbClr val="000000">
-                <a:alpha val="39999"/>
-              </a:srgbClr>
-            </a:outerShdw>
-          </a:effectLst>
+          <a:effectLst/>
           <a:extLst>
             <a:ext uri="{91240B29-F687-4f45-9708-019B960494DF}">
               <a14:hiddenLine xmlns="" xmlns:a14="http://schemas.microsoft.com/office/drawing/2010/main" w="9525">
@@ -10982,7 +10998,7 @@
           </a:extLst>
         </p:spPr>
         <p:txBody>
-          <a:bodyPr lIns="81638" tIns="42452" rIns="81638" bIns="42452" anchor="ctr"/>
+          <a:bodyPr lIns="0" tIns="0" rIns="0" bIns="0" anchor="ctr"/>
           <a:lstStyle/>
           <a:p>
             <a:pPr algn="ctr" eaLnBrk="1" hangingPunct="1">
@@ -10992,7 +11008,7 @@
               <a:buSzPct val="25000"/>
             </a:pPr>
             <a:r>
-              <a:rPr lang="en-US" sz="1300" i="1" dirty="0">
+              <a:rPr lang="en-US" sz="1300" dirty="0">
                 <a:solidFill>
                   <a:srgbClr val="000000"/>
                 </a:solidFill>
@@ -11028,7 +11044,7 @@
       </p:sp>
       <p:sp>
         <p:nvSpPr>
-          <p:cNvPr id="40" name="Rectangle 39"/>
+          <p:cNvPr id="40" name="Rounded Rectangle 39"/>
           <p:cNvSpPr>
             <a:spLocks noChangeArrowheads="1"/>
           </p:cNvSpPr>
@@ -11039,30 +11055,22 @@
             <a:off x="1424025" y="2248279"/>
             <a:ext cx="2377440" cy="457200"/>
           </a:xfrm>
-          <a:prstGeom prst="rect">
+          <a:prstGeom prst="roundRect">
             <a:avLst/>
           </a:prstGeom>
-          <a:solidFill>
-            <a:srgbClr val="FFFF00"/>
-          </a:solidFill>
-          <a:ln w="9525">
+          <a:noFill/>
+          <a:ln w="12700">
             <a:solidFill>
-              <a:srgbClr val="4A7EBB"/>
+              <a:schemeClr val="tx1"/>
             </a:solidFill>
             <a:miter lim="800000"/>
             <a:headEnd/>
             <a:tailEnd/>
           </a:ln>
-          <a:effectLst>
-            <a:outerShdw blurRad="40000" dist="23000" dir="5400000" rotWithShape="0">
-              <a:srgbClr val="000000">
-                <a:alpha val="34999"/>
-              </a:srgbClr>
-            </a:outerShdw>
-          </a:effectLst>
+          <a:effectLst/>
         </p:spPr>
         <p:txBody>
-          <a:bodyPr anchor="ctr"/>
+          <a:bodyPr lIns="0" tIns="0" rIns="0" bIns="0" anchor="ctr"/>
           <a:lstStyle/>
           <a:p>
             <a:pPr algn="ctr" eaLnBrk="1" hangingPunct="1">
@@ -11105,27 +11113,18 @@
             <a:off x="143866" y="3616782"/>
             <a:ext cx="2560320" cy="640080"/>
           </a:xfrm>
-          <a:prstGeom prst="rect">
+          <a:prstGeom prst="roundRect">
             <a:avLst/>
           </a:prstGeom>
           <a:solidFill>
-            <a:schemeClr val="tx2">
-              <a:lumMod val="20000"/>
-              <a:lumOff val="80000"/>
-            </a:schemeClr>
+            <a:srgbClr val="FFFF00"/>
           </a:solidFill>
-          <a:ln>
+          <a:ln w="12700">
             <a:solidFill>
               <a:srgbClr val="4A7EBB"/>
             </a:solidFill>
           </a:ln>
-          <a:effectLst>
-            <a:outerShdw blurRad="63500" dist="38182" dir="2700000" rotWithShape="0">
-              <a:srgbClr val="000000">
-                <a:alpha val="39999"/>
-              </a:srgbClr>
-            </a:outerShdw>
-          </a:effectLst>
+          <a:effectLst/>
           <a:extLst>
             <a:ext uri="{91240B29-F687-4f45-9708-019B960494DF}">
               <a14:hiddenLine xmlns="" xmlns:a14="http://schemas.microsoft.com/office/drawing/2010/main" w="9525">
@@ -11140,7 +11139,7 @@
           </a:extLst>
         </p:spPr>
         <p:txBody>
-          <a:bodyPr lIns="81638" tIns="42452" rIns="81638" bIns="42452" anchor="ctr"/>
+          <a:bodyPr lIns="0" tIns="0" rIns="0" bIns="0" anchor="ctr"/>
           <a:lstStyle/>
           <a:p>
             <a:pPr algn="ctr" eaLnBrk="1" hangingPunct="1">
@@ -11150,7 +11149,7 @@
               <a:buSzPct val="25000"/>
             </a:pPr>
             <a:r>
-              <a:rPr lang="en-US" sz="1300" i="1" dirty="0">
+              <a:rPr lang="en-US" sz="1300" dirty="0">
                 <a:solidFill>
                   <a:srgbClr val="000000"/>
                 </a:solidFill>
@@ -11186,7 +11185,7 @@
       </p:sp>
       <p:sp>
         <p:nvSpPr>
-          <p:cNvPr id="43" name="Rectangle 42"/>
+          <p:cNvPr id="43" name="Rounded Rectangle 42"/>
           <p:cNvSpPr>
             <a:spLocks noChangeArrowheads="1"/>
           </p:cNvSpPr>
@@ -11197,30 +11196,22 @@
             <a:off x="143864" y="4567527"/>
             <a:ext cx="2560320" cy="457200"/>
           </a:xfrm>
-          <a:prstGeom prst="rect">
+          <a:prstGeom prst="roundRect">
             <a:avLst/>
           </a:prstGeom>
-          <a:solidFill>
-            <a:srgbClr val="FFFF00"/>
-          </a:solidFill>
-          <a:ln w="9525">
+          <a:noFill/>
+          <a:ln w="12700">
             <a:solidFill>
-              <a:srgbClr val="4A7EBB"/>
+              <a:schemeClr val="tx1"/>
             </a:solidFill>
             <a:miter lim="800000"/>
             <a:headEnd/>
             <a:tailEnd/>
           </a:ln>
-          <a:effectLst>
-            <a:outerShdw blurRad="40000" dist="23000" dir="5400000" rotWithShape="0">
-              <a:srgbClr val="000000">
-                <a:alpha val="34999"/>
-              </a:srgbClr>
-            </a:outerShdw>
-          </a:effectLst>
+          <a:effectLst/>
         </p:spPr>
         <p:txBody>
-          <a:bodyPr anchor="ctr"/>
+          <a:bodyPr lIns="0" tIns="0" rIns="0" bIns="0" anchor="ctr"/>
           <a:lstStyle/>
           <a:p>
             <a:pPr algn="ctr" eaLnBrk="1" hangingPunct="1">
@@ -11253,10 +11244,7 @@
       <p:cxnSp>
         <p:nvCxnSpPr>
           <p:cNvPr id="4" name="Straight Arrow Connector 3"/>
-          <p:cNvCxnSpPr>
-            <a:stCxn id="42" idx="2"/>
-            <a:endCxn id="43" idx="0"/>
-          </p:cNvCxnSpPr>
+          <p:cNvCxnSpPr/>
           <p:nvPr/>
         </p:nvCxnSpPr>
         <p:spPr>
@@ -11270,6 +11258,7 @@
           <a:ln>
             <a:tailEnd type="triangle"/>
           </a:ln>
+          <a:effectLst/>
         </p:spPr>
         <p:style>
           <a:lnRef idx="2">
@@ -11299,27 +11288,18 @@
             <a:off x="3260278" y="3620369"/>
             <a:ext cx="2560320" cy="640080"/>
           </a:xfrm>
-          <a:prstGeom prst="rect">
+          <a:prstGeom prst="roundRect">
             <a:avLst/>
           </a:prstGeom>
           <a:solidFill>
-            <a:schemeClr val="tx2">
-              <a:lumMod val="20000"/>
-              <a:lumOff val="80000"/>
-            </a:schemeClr>
+            <a:srgbClr val="FFFF00"/>
           </a:solidFill>
-          <a:ln>
+          <a:ln w="12700">
             <a:solidFill>
               <a:srgbClr val="4A7EBB"/>
             </a:solidFill>
           </a:ln>
-          <a:effectLst>
-            <a:outerShdw blurRad="63500" dist="38182" dir="2700000" rotWithShape="0">
-              <a:srgbClr val="000000">
-                <a:alpha val="39999"/>
-              </a:srgbClr>
-            </a:outerShdw>
-          </a:effectLst>
+          <a:effectLst/>
           <a:extLst>
             <a:ext uri="{91240B29-F687-4f45-9708-019B960494DF}">
               <a14:hiddenLine xmlns="" xmlns:a14="http://schemas.microsoft.com/office/drawing/2010/main" w="9525">
@@ -11334,7 +11314,7 @@
           </a:extLst>
         </p:spPr>
         <p:txBody>
-          <a:bodyPr lIns="81638" tIns="42452" rIns="81638" bIns="42452" anchor="ctr"/>
+          <a:bodyPr lIns="0" tIns="0" rIns="0" bIns="0" anchor="ctr"/>
           <a:lstStyle/>
           <a:p>
             <a:pPr algn="ctr" eaLnBrk="1" hangingPunct="1">
@@ -11344,7 +11324,7 @@
               <a:buSzPct val="25000"/>
             </a:pPr>
             <a:r>
-              <a:rPr lang="en-US" sz="1300" i="1" dirty="0">
+              <a:rPr lang="en-US" sz="1300" dirty="0">
                 <a:solidFill>
                   <a:srgbClr val="000000"/>
                 </a:solidFill>
@@ -11380,7 +11360,7 @@
       </p:sp>
       <p:sp>
         <p:nvSpPr>
-          <p:cNvPr id="49" name="Rectangle 48"/>
+          <p:cNvPr id="49" name="Rounded Rectangle 48"/>
           <p:cNvSpPr>
             <a:spLocks noChangeArrowheads="1"/>
           </p:cNvSpPr>
@@ -11391,30 +11371,22 @@
             <a:off x="3260278" y="4567527"/>
             <a:ext cx="2560320" cy="457200"/>
           </a:xfrm>
-          <a:prstGeom prst="rect">
+          <a:prstGeom prst="roundRect">
             <a:avLst/>
           </a:prstGeom>
-          <a:solidFill>
-            <a:srgbClr val="FFFF00"/>
-          </a:solidFill>
-          <a:ln w="9525">
+          <a:noFill/>
+          <a:ln w="12700">
             <a:solidFill>
-              <a:srgbClr val="4A7EBB"/>
+              <a:schemeClr val="tx1"/>
             </a:solidFill>
             <a:miter lim="800000"/>
             <a:headEnd/>
             <a:tailEnd/>
           </a:ln>
-          <a:effectLst>
-            <a:outerShdw blurRad="40000" dist="23000" dir="5400000" rotWithShape="0">
-              <a:srgbClr val="000000">
-                <a:alpha val="34999"/>
-              </a:srgbClr>
-            </a:outerShdw>
-          </a:effectLst>
+          <a:effectLst/>
         </p:spPr>
         <p:txBody>
-          <a:bodyPr anchor="ctr"/>
+          <a:bodyPr lIns="0" tIns="0" rIns="0" bIns="0" anchor="ctr"/>
           <a:lstStyle/>
           <a:p>
             <a:pPr algn="ctr" eaLnBrk="1" hangingPunct="1">
@@ -11452,10 +11424,7 @@
       <p:cxnSp>
         <p:nvCxnSpPr>
           <p:cNvPr id="11" name="Straight Arrow Connector 10"/>
-          <p:cNvCxnSpPr>
-            <a:stCxn id="44" idx="2"/>
-            <a:endCxn id="49" idx="0"/>
-          </p:cNvCxnSpPr>
+          <p:cNvCxnSpPr/>
           <p:nvPr/>
         </p:nvCxnSpPr>
         <p:spPr>
@@ -11469,6 +11438,7 @@
           <a:ln>
             <a:tailEnd type="triangle"/>
           </a:ln>
+          <a:effectLst/>
         </p:spPr>
         <p:style>
           <a:lnRef idx="2">
@@ -11498,27 +11468,18 @@
             <a:off x="6376889" y="3616782"/>
             <a:ext cx="2560320" cy="640080"/>
           </a:xfrm>
-          <a:prstGeom prst="rect">
+          <a:prstGeom prst="roundRect">
             <a:avLst/>
           </a:prstGeom>
           <a:solidFill>
-            <a:schemeClr val="tx2">
-              <a:lumMod val="20000"/>
-              <a:lumOff val="80000"/>
-            </a:schemeClr>
+            <a:srgbClr val="FFFF00"/>
           </a:solidFill>
-          <a:ln>
+          <a:ln w="12700">
             <a:solidFill>
               <a:srgbClr val="4A7EBB"/>
             </a:solidFill>
           </a:ln>
-          <a:effectLst>
-            <a:outerShdw blurRad="63500" dist="38182" dir="2700000" rotWithShape="0">
-              <a:srgbClr val="000000">
-                <a:alpha val="39999"/>
-              </a:srgbClr>
-            </a:outerShdw>
-          </a:effectLst>
+          <a:effectLst/>
           <a:extLst>
             <a:ext uri="{91240B29-F687-4f45-9708-019B960494DF}">
               <a14:hiddenLine xmlns="" xmlns:a14="http://schemas.microsoft.com/office/drawing/2010/main" w="9525">
@@ -11533,7 +11494,7 @@
           </a:extLst>
         </p:spPr>
         <p:txBody>
-          <a:bodyPr lIns="81638" tIns="42452" rIns="81638" bIns="42452" anchor="ctr"/>
+          <a:bodyPr lIns="0" tIns="0" rIns="0" bIns="0" anchor="ctr"/>
           <a:lstStyle/>
           <a:p>
             <a:pPr algn="ctr" eaLnBrk="1" hangingPunct="1">
@@ -11543,7 +11504,7 @@
               <a:buSzPct val="25000"/>
             </a:pPr>
             <a:r>
-              <a:rPr lang="en-US" sz="1300" i="1" dirty="0">
+              <a:rPr lang="en-US" sz="1300" dirty="0">
                 <a:solidFill>
                   <a:srgbClr val="000000"/>
                 </a:solidFill>
@@ -11579,7 +11540,7 @@
       </p:sp>
       <p:sp>
         <p:nvSpPr>
-          <p:cNvPr id="62" name="Rectangle 61"/>
+          <p:cNvPr id="62" name="Rounded Rectangle 61"/>
           <p:cNvSpPr>
             <a:spLocks noChangeArrowheads="1"/>
           </p:cNvSpPr>
@@ -11590,30 +11551,22 @@
             <a:off x="6376691" y="4573740"/>
             <a:ext cx="2560320" cy="457200"/>
           </a:xfrm>
-          <a:prstGeom prst="rect">
+          <a:prstGeom prst="roundRect">
             <a:avLst/>
           </a:prstGeom>
-          <a:solidFill>
-            <a:srgbClr val="FFFF00"/>
-          </a:solidFill>
-          <a:ln w="9525">
+          <a:noFill/>
+          <a:ln w="12700">
             <a:solidFill>
-              <a:srgbClr val="4A7EBB"/>
+              <a:schemeClr val="tx1"/>
             </a:solidFill>
             <a:miter lim="800000"/>
             <a:headEnd/>
             <a:tailEnd/>
           </a:ln>
-          <a:effectLst>
-            <a:outerShdw blurRad="40000" dist="23000" dir="5400000" rotWithShape="0">
-              <a:srgbClr val="000000">
-                <a:alpha val="34999"/>
-              </a:srgbClr>
-            </a:outerShdw>
-          </a:effectLst>
+          <a:effectLst/>
         </p:spPr>
         <p:txBody>
-          <a:bodyPr anchor="ctr"/>
+          <a:bodyPr lIns="0" tIns="0" rIns="0" bIns="0" anchor="ctr"/>
           <a:lstStyle/>
           <a:p>
             <a:pPr algn="ctr" eaLnBrk="1" hangingPunct="1">
@@ -11677,27 +11630,18 @@
             <a:off x="6376691" y="5347818"/>
             <a:ext cx="2560320" cy="640080"/>
           </a:xfrm>
-          <a:prstGeom prst="rect">
+          <a:prstGeom prst="roundRect">
             <a:avLst/>
           </a:prstGeom>
           <a:solidFill>
-            <a:schemeClr val="tx2">
-              <a:lumMod val="20000"/>
-              <a:lumOff val="80000"/>
-            </a:schemeClr>
+            <a:srgbClr val="FFFF00"/>
           </a:solidFill>
-          <a:ln>
+          <a:ln w="12700">
             <a:solidFill>
               <a:srgbClr val="4A7EBB"/>
             </a:solidFill>
           </a:ln>
-          <a:effectLst>
-            <a:outerShdw blurRad="63500" dist="38182" dir="2700000" rotWithShape="0">
-              <a:srgbClr val="000000">
-                <a:alpha val="39999"/>
-              </a:srgbClr>
-            </a:outerShdw>
-          </a:effectLst>
+          <a:effectLst/>
           <a:extLst>
             <a:ext uri="{91240B29-F687-4f45-9708-019B960494DF}">
               <a14:hiddenLine xmlns="" xmlns:a14="http://schemas.microsoft.com/office/drawing/2010/main" w="9525">
@@ -11712,7 +11656,7 @@
           </a:extLst>
         </p:spPr>
         <p:txBody>
-          <a:bodyPr lIns="81638" tIns="42452" rIns="81638" bIns="42452" anchor="ctr"/>
+          <a:bodyPr lIns="0" tIns="0" rIns="0" bIns="0" anchor="ctr"/>
           <a:lstStyle/>
           <a:p>
             <a:pPr algn="ctr" eaLnBrk="1" hangingPunct="1">
@@ -11722,7 +11666,7 @@
               <a:buSzPct val="25000"/>
             </a:pPr>
             <a:r>
-              <a:rPr lang="en-US" sz="1300" i="1" dirty="0">
+              <a:rPr lang="en-US" sz="1300" dirty="0">
                 <a:solidFill>
                   <a:srgbClr val="000000"/>
                 </a:solidFill>
@@ -11758,7 +11702,7 @@
       </p:sp>
       <p:sp>
         <p:nvSpPr>
-          <p:cNvPr id="69" name="Rectangle 68"/>
+          <p:cNvPr id="69" name="Rounded Rectangle 68"/>
           <p:cNvSpPr>
             <a:spLocks noChangeArrowheads="1"/>
           </p:cNvSpPr>
@@ -11769,30 +11713,22 @@
             <a:off x="6376691" y="6304775"/>
             <a:ext cx="2560320" cy="457200"/>
           </a:xfrm>
-          <a:prstGeom prst="rect">
+          <a:prstGeom prst="roundRect">
             <a:avLst/>
           </a:prstGeom>
-          <a:solidFill>
-            <a:srgbClr val="FFFF00"/>
-          </a:solidFill>
-          <a:ln w="9525">
+          <a:noFill/>
+          <a:ln w="12700">
             <a:solidFill>
-              <a:srgbClr val="4A7EBB"/>
+              <a:schemeClr val="tx1"/>
             </a:solidFill>
             <a:miter lim="800000"/>
             <a:headEnd/>
             <a:tailEnd/>
           </a:ln>
-          <a:effectLst>
-            <a:outerShdw blurRad="40000" dist="23000" dir="5400000" rotWithShape="0">
-              <a:srgbClr val="000000">
-                <a:alpha val="34999"/>
-              </a:srgbClr>
-            </a:outerShdw>
-          </a:effectLst>
+          <a:effectLst/>
         </p:spPr>
         <p:txBody>
-          <a:bodyPr anchor="ctr"/>
+          <a:bodyPr lIns="0" tIns="0" rIns="0" bIns="0" anchor="ctr"/>
           <a:lstStyle/>
           <a:p>
             <a:pPr algn="ctr" eaLnBrk="1" hangingPunct="1">
@@ -11830,10 +11766,7 @@
       <p:cxnSp>
         <p:nvCxnSpPr>
           <p:cNvPr id="70" name="Straight Arrow Connector 69"/>
-          <p:cNvCxnSpPr>
-            <a:stCxn id="68" idx="2"/>
-            <a:endCxn id="69" idx="0"/>
-          </p:cNvCxnSpPr>
+          <p:cNvCxnSpPr/>
           <p:nvPr/>
         </p:nvCxnSpPr>
         <p:spPr>
@@ -11847,6 +11780,7 @@
           <a:ln>
             <a:tailEnd type="triangle"/>
           </a:ln>
+          <a:effectLst/>
         </p:spPr>
         <p:style>
           <a:lnRef idx="2">
@@ -11866,10 +11800,7 @@
       <p:cxnSp>
         <p:nvCxnSpPr>
           <p:cNvPr id="24" name="Straight Arrow Connector 23"/>
-          <p:cNvCxnSpPr>
-            <a:stCxn id="62" idx="2"/>
-            <a:endCxn id="68" idx="0"/>
-          </p:cNvCxnSpPr>
+          <p:cNvCxnSpPr/>
           <p:nvPr/>
         </p:nvCxnSpPr>
         <p:spPr>
@@ -11883,6 +11814,7 @@
           <a:ln w="63500" cmpd="dbl">
             <a:tailEnd type="triangle"/>
           </a:ln>
+          <a:effectLst/>
         </p:spPr>
         <p:style>
           <a:lnRef idx="2">
@@ -11902,10 +11834,7 @@
       <p:cxnSp>
         <p:nvCxnSpPr>
           <p:cNvPr id="28" name="Straight Arrow Connector 27"/>
-          <p:cNvCxnSpPr>
-            <a:stCxn id="57" idx="2"/>
-            <a:endCxn id="62" idx="0"/>
-          </p:cNvCxnSpPr>
+          <p:cNvCxnSpPr/>
           <p:nvPr/>
         </p:nvCxnSpPr>
         <p:spPr>
@@ -11919,6 +11848,7 @@
           <a:ln w="63500" cmpd="dbl">
             <a:tailEnd type="triangle"/>
           </a:ln>
+          <a:effectLst/>
         </p:spPr>
         <p:style>
           <a:lnRef idx="2">
@@ -11949,6 +11879,7 @@
           <a:prstGeom prst="ellipse">
             <a:avLst/>
           </a:prstGeom>
+          <a:effectLst/>
         </p:spPr>
         <p:style>
           <a:lnRef idx="1">
@@ -11987,7 +11918,6 @@
         <p:nvCxnSpPr>
           <p:cNvPr id="45" name="Elbow Connector 44"/>
           <p:cNvCxnSpPr>
-            <a:stCxn id="34" idx="2"/>
             <a:endCxn id="32" idx="6"/>
           </p:cNvCxnSpPr>
           <p:nvPr/>
@@ -12003,6 +11933,7 @@
           <a:ln>
             <a:tailEnd type="triangle"/>
           </a:ln>
+          <a:effectLst/>
         </p:spPr>
         <p:style>
           <a:lnRef idx="2">
@@ -12023,7 +11954,6 @@
         <p:nvCxnSpPr>
           <p:cNvPr id="48" name="Elbow Connector 47"/>
           <p:cNvCxnSpPr>
-            <a:stCxn id="40" idx="2"/>
             <a:endCxn id="32" idx="2"/>
           </p:cNvCxnSpPr>
           <p:nvPr/>
@@ -12039,6 +11969,7 @@
           <a:ln>
             <a:tailEnd type="triangle"/>
           </a:ln>
+          <a:effectLst/>
         </p:spPr>
         <p:style>
           <a:lnRef idx="2">
@@ -12058,10 +11989,7 @@
       <p:cxnSp>
         <p:nvCxnSpPr>
           <p:cNvPr id="63" name="Straight Arrow Connector 62"/>
-          <p:cNvCxnSpPr>
-            <a:stCxn id="38" idx="2"/>
-            <a:endCxn id="136" idx="0"/>
-          </p:cNvCxnSpPr>
+          <p:cNvCxnSpPr/>
           <p:nvPr/>
         </p:nvCxnSpPr>
         <p:spPr>
@@ -12075,6 +12003,7 @@
           <a:ln>
             <a:tailEnd type="triangle"/>
           </a:ln>
+          <a:effectLst/>
         </p:spPr>
         <p:style>
           <a:lnRef idx="2">
@@ -12094,10 +12023,7 @@
       <p:cxnSp>
         <p:nvCxnSpPr>
           <p:cNvPr id="11265" name="Straight Arrow Connector 11264"/>
-          <p:cNvCxnSpPr>
-            <a:stCxn id="136" idx="2"/>
-            <a:endCxn id="40" idx="0"/>
-          </p:cNvCxnSpPr>
+          <p:cNvCxnSpPr/>
           <p:nvPr/>
         </p:nvCxnSpPr>
         <p:spPr>
@@ -12111,6 +12037,7 @@
           <a:ln>
             <a:tailEnd type="triangle"/>
           </a:ln>
+          <a:effectLst/>
         </p:spPr>
         <p:style>
           <a:lnRef idx="2">
@@ -12130,10 +12057,7 @@
       <p:cxnSp>
         <p:nvCxnSpPr>
           <p:cNvPr id="11272" name="Straight Arrow Connector 11271"/>
-          <p:cNvCxnSpPr>
-            <a:stCxn id="35" idx="2"/>
-            <a:endCxn id="39" idx="0"/>
-          </p:cNvCxnSpPr>
+          <p:cNvCxnSpPr/>
           <p:nvPr/>
         </p:nvCxnSpPr>
         <p:spPr>
@@ -12147,6 +12071,7 @@
           <a:ln>
             <a:tailEnd type="triangle"/>
           </a:ln>
+          <a:effectLst/>
         </p:spPr>
         <p:style>
           <a:lnRef idx="2">
@@ -12166,10 +12091,7 @@
       <p:cxnSp>
         <p:nvCxnSpPr>
           <p:cNvPr id="11274" name="Straight Arrow Connector 11273"/>
-          <p:cNvCxnSpPr>
-            <a:stCxn id="39" idx="2"/>
-            <a:endCxn id="34" idx="0"/>
-          </p:cNvCxnSpPr>
+          <p:cNvCxnSpPr/>
           <p:nvPr/>
         </p:nvCxnSpPr>
         <p:spPr>
@@ -12183,6 +12105,7 @@
           <a:ln>
             <a:tailEnd type="triangle"/>
           </a:ln>
+          <a:effectLst/>
         </p:spPr>
         <p:style>
           <a:lnRef idx="2">
@@ -12204,7 +12127,6 @@
           <p:cNvPr id="168" name="Elbow Connector 167"/>
           <p:cNvCxnSpPr>
             <a:stCxn id="32" idx="4"/>
-            <a:endCxn id="42" idx="0"/>
           </p:cNvCxnSpPr>
           <p:nvPr/>
         </p:nvCxnSpPr>
@@ -12221,6 +12143,7 @@
           <a:ln w="63500" cmpd="dbl">
             <a:tailEnd type="triangle"/>
           </a:ln>
+          <a:effectLst/>
         </p:spPr>
         <p:style>
           <a:lnRef idx="2">
@@ -12242,7 +12165,6 @@
           <p:cNvPr id="170" name="Elbow Connector 169"/>
           <p:cNvCxnSpPr>
             <a:stCxn id="32" idx="4"/>
-            <a:endCxn id="57" idx="0"/>
           </p:cNvCxnSpPr>
           <p:nvPr/>
         </p:nvCxnSpPr>
@@ -12259,6 +12181,7 @@
           <a:ln w="63500" cmpd="dbl">
             <a:tailEnd type="triangle"/>
           </a:ln>
+          <a:effectLst/>
         </p:spPr>
         <p:style>
           <a:lnRef idx="2">
@@ -12280,7 +12203,6 @@
           <p:cNvPr id="11335" name="Straight Arrow Connector 11334"/>
           <p:cNvCxnSpPr>
             <a:stCxn id="32" idx="4"/>
-            <a:endCxn id="44" idx="0"/>
           </p:cNvCxnSpPr>
           <p:nvPr/>
         </p:nvCxnSpPr>
@@ -12295,6 +12217,7 @@
           <a:ln w="63500" cmpd="dbl">
             <a:tailEnd type="triangle"/>
           </a:ln>
+          <a:effectLst/>
         </p:spPr>
         <p:style>
           <a:lnRef idx="2">
@@ -12326,6 +12249,7 @@
             <a:avLst/>
           </a:prstGeom>
           <a:noFill/>
+          <a:effectLst/>
         </p:spPr>
         <p:txBody>
           <a:bodyPr wrap="square" rtlCol="0">
@@ -12351,7 +12275,7 @@
                 <a:ea typeface="Consolas" charset="0"/>
                 <a:cs typeface="Consolas" charset="0"/>
               </a:rPr>
-              <a:t>2018-03-14_13_CCMI_Workshop_Project.ipynb</a:t>
+              <a:t>2018-03-14_13_UCSF_Workshop_Project.ipynb</a:t>
             </a:r>
             <a:r>
               <a:rPr lang="en-US" sz="1600" dirty="0">
@@ -12366,7 +12290,7 @@
       </p:sp>
       <p:sp>
         <p:nvSpPr>
-          <p:cNvPr id="36" name="Rectangle 35"/>
+          <p:cNvPr id="36" name="Rounded Rectangle 35"/>
           <p:cNvSpPr>
             <a:spLocks noChangeArrowheads="1"/>
           </p:cNvSpPr>
@@ -12377,7 +12301,7 @@
             <a:off x="2235652" y="5587775"/>
             <a:ext cx="2560320" cy="457200"/>
           </a:xfrm>
-          <a:prstGeom prst="rect">
+          <a:prstGeom prst="roundRect">
             <a:avLst/>
           </a:prstGeom>
           <a:solidFill>
@@ -12386,7 +12310,7 @@
               <a:lumOff val="60000"/>
             </a:schemeClr>
           </a:solidFill>
-          <a:ln w="9525">
+          <a:ln w="12700">
             <a:solidFill>
               <a:srgbClr val="4A7EBB"/>
             </a:solidFill>
@@ -12394,23 +12318,17 @@
             <a:headEnd/>
             <a:tailEnd/>
           </a:ln>
-          <a:effectLst>
-            <a:outerShdw blurRad="40000" dist="23000" dir="5400000" rotWithShape="0">
-              <a:srgbClr val="000000">
-                <a:alpha val="34999"/>
-              </a:srgbClr>
-            </a:outerShdw>
-          </a:effectLst>
+          <a:effectLst/>
         </p:spPr>
         <p:txBody>
-          <a:bodyPr anchor="ctr"/>
+          <a:bodyPr lIns="0" tIns="0" rIns="0" bIns="0" anchor="ctr"/>
           <a:lstStyle/>
           <a:p>
             <a:pPr algn="ctr" eaLnBrk="1" hangingPunct="1">
               <a:defRPr/>
             </a:pPr>
             <a:r>
-              <a:rPr lang="en-US" sz="1300" i="1" dirty="0">
+              <a:rPr lang="en-US" sz="1300" dirty="0">
                 <a:latin typeface="PT Sans" charset="-52"/>
                 <a:ea typeface="PT Sans" charset="-52"/>
                 <a:cs typeface="PT Sans" charset="-52"/>
@@ -12436,10 +12354,7 @@
       <p:cxnSp>
         <p:nvCxnSpPr>
           <p:cNvPr id="37" name="Curved Connector 36"/>
-          <p:cNvCxnSpPr>
-            <a:stCxn id="49" idx="2"/>
-            <a:endCxn id="36" idx="0"/>
-          </p:cNvCxnSpPr>
+          <p:cNvCxnSpPr/>
           <p:nvPr/>
         </p:nvCxnSpPr>
         <p:spPr>
@@ -12453,6 +12368,7 @@
           <a:ln>
             <a:tailEnd type="triangle"/>
           </a:ln>
+          <a:effectLst/>
         </p:spPr>
         <p:style>
           <a:lnRef idx="2">
@@ -12472,10 +12388,7 @@
       <p:cxnSp>
         <p:nvCxnSpPr>
           <p:cNvPr id="46" name="Curved Connector 45"/>
-          <p:cNvCxnSpPr>
-            <a:stCxn id="43" idx="2"/>
-            <a:endCxn id="36" idx="1"/>
-          </p:cNvCxnSpPr>
+          <p:cNvCxnSpPr/>
           <p:nvPr/>
         </p:nvCxnSpPr>
         <p:spPr>
@@ -12489,6 +12402,7 @@
           <a:ln>
             <a:tailEnd type="triangle"/>
           </a:ln>
+          <a:effectLst/>
         </p:spPr>
         <p:style>
           <a:lnRef idx="2">
@@ -12508,10 +12422,7 @@
       <p:cxnSp>
         <p:nvCxnSpPr>
           <p:cNvPr id="50" name="Curved Connector 49"/>
-          <p:cNvCxnSpPr>
-            <a:stCxn id="69" idx="1"/>
-            <a:endCxn id="36" idx="3"/>
-          </p:cNvCxnSpPr>
+          <p:cNvCxnSpPr/>
           <p:nvPr/>
         </p:nvCxnSpPr>
         <p:spPr>
@@ -12525,6 +12436,7 @@
           <a:ln>
             <a:tailEnd type="triangle"/>
           </a:ln>
+          <a:effectLst/>
         </p:spPr>
         <p:style>
           <a:lnRef idx="2">
@@ -12568,6 +12480,106 @@
       </p:grpSpPr>
       <p:sp>
         <p:nvSpPr>
+          <p:cNvPr id="132" name="Shape 132"/>
+          <p:cNvSpPr txBox="1"/>
+          <p:nvPr/>
+        </p:nvSpPr>
+        <p:spPr>
+          <a:xfrm>
+            <a:off x="1530350" y="267495"/>
+            <a:ext cx="7370763" cy="355599"/>
+          </a:xfrm>
+          <a:prstGeom prst="rect">
+            <a:avLst/>
+          </a:prstGeom>
+          <a:noFill/>
+          <a:ln>
+            <a:noFill/>
+          </a:ln>
+          <a:effectLst/>
+        </p:spPr>
+        <p:txBody>
+          <a:bodyPr lIns="0" tIns="0" rIns="0" bIns="0" anchor="ctr"/>
+          <a:lstStyle/>
+          <a:p>
+            <a:pPr eaLnBrk="1" hangingPunct="1">
+              <a:spcBef>
+                <a:spcPts val="0"/>
+              </a:spcBef>
+              <a:buSzPct val="25000"/>
+              <a:defRPr/>
+            </a:pPr>
+            <a:r>
+              <a:rPr lang="en-US" sz="2800" b="1" dirty="0">
+                <a:solidFill>
+                  <a:srgbClr val="050505"/>
+                </a:solidFill>
+                <a:latin typeface="PT Serif" charset="0"/>
+                <a:ea typeface="PT Serif" charset="0"/>
+                <a:cs typeface="PT Serif" charset="0"/>
+                <a:sym typeface="Arial"/>
+              </a:rPr>
+              <a:t>Analyzing HTSeq Data Using GenePattern</a:t>
+            </a:r>
+          </a:p>
+        </p:txBody>
+      </p:sp>
+      <p:pic>
+        <p:nvPicPr>
+          <p:cNvPr id="11270" name="Shape 133"/>
+          <p:cNvPicPr preferRelativeResize="0">
+            <a:picLocks noChangeAspect="1" noChangeArrowheads="1"/>
+          </p:cNvPicPr>
+          <p:nvPr/>
+        </p:nvPicPr>
+        <p:blipFill>
+          <a:blip r:embed="rId3">
+            <a:extLst>
+              <a:ext uri="{28A0092B-C50C-407E-A947-70E740481C1C}">
+                <a14:useLocalDpi xmlns:a14="http://schemas.microsoft.com/office/drawing/2010/main" val="0"/>
+              </a:ext>
+            </a:extLst>
+          </a:blip>
+          <a:srcRect/>
+          <a:stretch>
+            <a:fillRect/>
+          </a:stretch>
+        </p:blipFill>
+        <p:spPr bwMode="auto">
+          <a:xfrm>
+            <a:off x="463605" y="-18047"/>
+            <a:ext cx="889000" cy="926681"/>
+          </a:xfrm>
+          <a:prstGeom prst="rect">
+            <a:avLst/>
+          </a:prstGeom>
+          <a:noFill/>
+          <a:ln>
+            <a:noFill/>
+          </a:ln>
+          <a:extLst>
+            <a:ext uri="{909E8E84-426E-40dd-AFC4-6F175D3DCCD1}">
+              <a14:hiddenFill xmlns="" xmlns:a14="http://schemas.microsoft.com/office/drawing/2010/main">
+                <a:solidFill>
+                  <a:srgbClr val="FFFFFF"/>
+                </a:solidFill>
+              </a14:hiddenFill>
+            </a:ext>
+            <a:ext uri="{91240B29-F687-4f45-9708-019B960494DF}">
+              <a14:hiddenLine xmlns="" xmlns:a14="http://schemas.microsoft.com/office/drawing/2010/main" w="9525">
+                <a:solidFill>
+                  <a:srgbClr val="000000"/>
+                </a:solidFill>
+                <a:miter lim="800000"/>
+                <a:headEnd/>
+                <a:tailEnd/>
+              </a14:hiddenLine>
+            </a:ext>
+          </a:extLst>
+        </p:spPr>
+      </p:pic>
+      <p:sp>
+        <p:nvSpPr>
           <p:cNvPr id="136" name="Shape 136"/>
           <p:cNvSpPr>
             <a:spLocks noChangeArrowheads="1"/>
@@ -12576,30 +12588,21 @@
         </p:nvSpPr>
         <p:spPr bwMode="auto">
           <a:xfrm flipH="1">
-            <a:off x="1472792" y="811218"/>
+            <a:off x="1424024" y="1396434"/>
             <a:ext cx="2377440" cy="640080"/>
           </a:xfrm>
-          <a:prstGeom prst="rect">
+          <a:prstGeom prst="roundRect">
             <a:avLst/>
           </a:prstGeom>
           <a:solidFill>
-            <a:schemeClr val="tx2">
-              <a:lumMod val="20000"/>
-              <a:lumOff val="80000"/>
-            </a:schemeClr>
+            <a:srgbClr val="FFFF00"/>
           </a:solidFill>
-          <a:ln>
+          <a:ln w="12700">
             <a:solidFill>
               <a:srgbClr val="4A7EBB"/>
             </a:solidFill>
           </a:ln>
-          <a:effectLst>
-            <a:outerShdw blurRad="63500" dist="38182" dir="2700000" rotWithShape="0">
-              <a:srgbClr val="000000">
-                <a:alpha val="39999"/>
-              </a:srgbClr>
-            </a:outerShdw>
-          </a:effectLst>
+          <a:effectLst/>
           <a:extLst>
             <a:ext uri="{91240B29-F687-4f45-9708-019B960494DF}">
               <a14:hiddenLine xmlns="" xmlns:a14="http://schemas.microsoft.com/office/drawing/2010/main" w="9525">
@@ -12614,7 +12617,7 @@
           </a:extLst>
         </p:spPr>
         <p:txBody>
-          <a:bodyPr lIns="81638" tIns="42452" rIns="81638" bIns="42452" anchor="ctr"/>
+          <a:bodyPr lIns="0" tIns="0" rIns="0" bIns="0" anchor="ctr"/>
           <a:lstStyle/>
           <a:p>
             <a:pPr algn="ctr" eaLnBrk="1" hangingPunct="1">
@@ -12625,7 +12628,7 @@
               <a:defRPr/>
             </a:pPr>
             <a:r>
-              <a:rPr lang="en-US" sz="1300" i="1" dirty="0">
+              <a:rPr lang="en-US" sz="1300" dirty="0">
                 <a:solidFill>
                   <a:srgbClr val="000000"/>
                 </a:solidFill>
@@ -12634,29 +12637,8 @@
                 <a:cs typeface="PT Sans" charset="-52"/>
                 <a:sym typeface="Arial"/>
               </a:rPr>
-              <a:t>Load a file to </a:t>
-            </a:r>
-            <a:r>
-              <a:rPr lang="en-US" sz="1300" i="1">
-                <a:solidFill>
-                  <a:srgbClr val="000000"/>
-                </a:solidFill>
-                <a:latin typeface="PT Sans" charset="-52"/>
-                <a:ea typeface="PT Sans" charset="-52"/>
-                <a:cs typeface="PT Sans" charset="-52"/>
-                <a:sym typeface="Arial"/>
-              </a:rPr>
-              <a:t>be easily accessible</a:t>
-            </a:r>
-            <a:endParaRPr lang="en-US" sz="1300" i="1" dirty="0">
-              <a:solidFill>
-                <a:srgbClr val="000000"/>
-              </a:solidFill>
-              <a:latin typeface="PT Sans" charset="-52"/>
-              <a:ea typeface="PT Sans" charset="-52"/>
-              <a:cs typeface="PT Sans" charset="-52"/>
-              <a:sym typeface="Arial"/>
-            </a:endParaRPr>
+              <a:t>Load a file to be easily accessible</a:t>
+            </a:r>
           </a:p>
           <a:p>
             <a:pPr algn="ctr" eaLnBrk="1" hangingPunct="1">
@@ -12683,7 +12665,7 @@
       </p:sp>
       <p:sp>
         <p:nvSpPr>
-          <p:cNvPr id="34" name="Rectangle 33"/>
+          <p:cNvPr id="34" name="Rounded Rectangle 33"/>
           <p:cNvSpPr>
             <a:spLocks noChangeArrowheads="1"/>
           </p:cNvSpPr>
@@ -12691,33 +12673,25 @@
         </p:nvSpPr>
         <p:spPr bwMode="auto">
           <a:xfrm>
-            <a:off x="5145298" y="1657588"/>
+            <a:off x="5096530" y="2242804"/>
             <a:ext cx="2560320" cy="457200"/>
           </a:xfrm>
-          <a:prstGeom prst="rect">
+          <a:prstGeom prst="roundRect">
             <a:avLst/>
           </a:prstGeom>
-          <a:solidFill>
-            <a:srgbClr val="FFFF00"/>
-          </a:solidFill>
-          <a:ln w="9525">
+          <a:noFill/>
+          <a:ln w="12700">
             <a:solidFill>
-              <a:srgbClr val="4A7EBB"/>
+              <a:schemeClr val="tx1"/>
             </a:solidFill>
             <a:miter lim="800000"/>
             <a:headEnd/>
             <a:tailEnd/>
           </a:ln>
-          <a:effectLst>
-            <a:outerShdw blurRad="40000" dist="23000" dir="5400000" rotWithShape="0">
-              <a:srgbClr val="000000">
-                <a:alpha val="34999"/>
-              </a:srgbClr>
-            </a:outerShdw>
-          </a:effectLst>
+          <a:effectLst/>
         </p:spPr>
         <p:txBody>
-          <a:bodyPr anchor="ctr"/>
+          <a:bodyPr lIns="0" tIns="0" rIns="0" bIns="0" anchor="ctr"/>
           <a:lstStyle/>
           <a:p>
             <a:pPr algn="ctr" eaLnBrk="1" hangingPunct="1"/>
@@ -12745,7 +12719,7 @@
       </p:sp>
       <p:sp>
         <p:nvSpPr>
-          <p:cNvPr id="35" name="Rectangle 34"/>
+          <p:cNvPr id="35" name="Rounded Rectangle 34"/>
           <p:cNvSpPr>
             <a:spLocks noChangeArrowheads="1"/>
           </p:cNvSpPr>
@@ -12753,33 +12727,25 @@
         </p:nvSpPr>
         <p:spPr bwMode="auto">
           <a:xfrm>
-            <a:off x="5145299" y="147729"/>
+            <a:off x="5096531" y="732945"/>
             <a:ext cx="2560320" cy="457200"/>
           </a:xfrm>
-          <a:prstGeom prst="rect">
+          <a:prstGeom prst="roundRect">
             <a:avLst/>
           </a:prstGeom>
-          <a:solidFill>
-            <a:srgbClr val="FFFF00"/>
-          </a:solidFill>
-          <a:ln w="9525">
+          <a:noFill/>
+          <a:ln w="12700">
             <a:solidFill>
-              <a:srgbClr val="4A7EBB"/>
+              <a:schemeClr val="tx1"/>
             </a:solidFill>
             <a:miter lim="800000"/>
             <a:headEnd/>
             <a:tailEnd/>
           </a:ln>
-          <a:effectLst>
-            <a:outerShdw blurRad="40000" dist="23000" dir="5400000" rotWithShape="0">
-              <a:srgbClr val="000000">
-                <a:alpha val="34999"/>
-              </a:srgbClr>
-            </a:outerShdw>
-          </a:effectLst>
+          <a:effectLst/>
         </p:spPr>
         <p:txBody>
-          <a:bodyPr anchor="ctr"/>
+          <a:bodyPr lIns="0" tIns="0" rIns="0" bIns="0" anchor="ctr"/>
           <a:lstStyle/>
           <a:p>
             <a:pPr algn="ctr" eaLnBrk="1" hangingPunct="1">
@@ -12811,7 +12777,7 @@
       </p:sp>
       <p:sp>
         <p:nvSpPr>
-          <p:cNvPr id="38" name="Rectangle 37"/>
+          <p:cNvPr id="38" name="Rounded Rectangle 37"/>
           <p:cNvSpPr>
             <a:spLocks noChangeArrowheads="1"/>
           </p:cNvSpPr>
@@ -12819,33 +12785,25 @@
         </p:nvSpPr>
         <p:spPr bwMode="auto">
           <a:xfrm>
-            <a:off x="1472794" y="146173"/>
+            <a:off x="1424026" y="731389"/>
             <a:ext cx="2377440" cy="457200"/>
           </a:xfrm>
-          <a:prstGeom prst="rect">
+          <a:prstGeom prst="roundRect">
             <a:avLst/>
           </a:prstGeom>
-          <a:solidFill>
-            <a:srgbClr val="FFFF00"/>
-          </a:solidFill>
-          <a:ln w="9525">
+          <a:noFill/>
+          <a:ln w="12700">
             <a:solidFill>
-              <a:srgbClr val="4A7EBB"/>
+              <a:schemeClr val="tx1"/>
             </a:solidFill>
             <a:miter lim="800000"/>
             <a:headEnd/>
             <a:tailEnd/>
           </a:ln>
-          <a:effectLst>
-            <a:outerShdw blurRad="40000" dist="23000" dir="5400000" rotWithShape="0">
-              <a:srgbClr val="000000">
-                <a:alpha val="34999"/>
-              </a:srgbClr>
-            </a:outerShdw>
-          </a:effectLst>
+          <a:effectLst/>
         </p:spPr>
         <p:txBody>
-          <a:bodyPr anchor="ctr"/>
+          <a:bodyPr lIns="0" tIns="0" rIns="0" bIns="0" anchor="ctr"/>
           <a:lstStyle/>
           <a:p>
             <a:pPr algn="ctr" eaLnBrk="1" hangingPunct="1">
@@ -12885,30 +12843,21 @@
         </p:nvSpPr>
         <p:spPr bwMode="auto">
           <a:xfrm flipH="1">
-            <a:off x="5145298" y="811218"/>
+            <a:off x="5096530" y="1396434"/>
             <a:ext cx="2560320" cy="640080"/>
           </a:xfrm>
-          <a:prstGeom prst="rect">
+          <a:prstGeom prst="roundRect">
             <a:avLst/>
           </a:prstGeom>
           <a:solidFill>
-            <a:schemeClr val="tx2">
-              <a:lumMod val="20000"/>
-              <a:lumOff val="80000"/>
-            </a:schemeClr>
+            <a:srgbClr val="FFFF00"/>
           </a:solidFill>
-          <a:ln>
+          <a:ln w="12700">
             <a:solidFill>
               <a:srgbClr val="4A7EBB"/>
             </a:solidFill>
           </a:ln>
-          <a:effectLst>
-            <a:outerShdw blurRad="63500" dist="38182" dir="2700000" rotWithShape="0">
-              <a:srgbClr val="000000">
-                <a:alpha val="39999"/>
-              </a:srgbClr>
-            </a:outerShdw>
-          </a:effectLst>
+          <a:effectLst/>
           <a:extLst>
             <a:ext uri="{91240B29-F687-4f45-9708-019B960494DF}">
               <a14:hiddenLine xmlns="" xmlns:a14="http://schemas.microsoft.com/office/drawing/2010/main" w="9525">
@@ -12923,7 +12872,7 @@
           </a:extLst>
         </p:spPr>
         <p:txBody>
-          <a:bodyPr lIns="81638" tIns="42452" rIns="81638" bIns="42452" anchor="ctr"/>
+          <a:bodyPr lIns="0" tIns="0" rIns="0" bIns="0" anchor="ctr"/>
           <a:lstStyle/>
           <a:p>
             <a:pPr algn="ctr" eaLnBrk="1" hangingPunct="1">
@@ -12933,7 +12882,7 @@
               <a:buSzPct val="25000"/>
             </a:pPr>
             <a:r>
-              <a:rPr lang="en-US" sz="1300" i="1" dirty="0">
+              <a:rPr lang="en-US" sz="1300" dirty="0">
                 <a:solidFill>
                   <a:srgbClr val="000000"/>
                 </a:solidFill>
@@ -12969,7 +12918,7 @@
       </p:sp>
       <p:sp>
         <p:nvSpPr>
-          <p:cNvPr id="40" name="Rectangle 39"/>
+          <p:cNvPr id="40" name="Rounded Rectangle 39"/>
           <p:cNvSpPr>
             <a:spLocks noChangeArrowheads="1"/>
           </p:cNvSpPr>
@@ -12977,33 +12926,25 @@
         </p:nvSpPr>
         <p:spPr bwMode="auto">
           <a:xfrm>
-            <a:off x="1472793" y="1663063"/>
+            <a:off x="1424025" y="2248279"/>
             <a:ext cx="2377440" cy="457200"/>
           </a:xfrm>
-          <a:prstGeom prst="rect">
+          <a:prstGeom prst="roundRect">
             <a:avLst/>
           </a:prstGeom>
-          <a:solidFill>
-            <a:srgbClr val="FFFF00"/>
-          </a:solidFill>
-          <a:ln w="9525">
+          <a:noFill/>
+          <a:ln w="12700">
             <a:solidFill>
-              <a:srgbClr val="4A7EBB"/>
+              <a:schemeClr val="tx1"/>
             </a:solidFill>
             <a:miter lim="800000"/>
             <a:headEnd/>
             <a:tailEnd/>
           </a:ln>
-          <a:effectLst>
-            <a:outerShdw blurRad="40000" dist="23000" dir="5400000" rotWithShape="0">
-              <a:srgbClr val="000000">
-                <a:alpha val="34999"/>
-              </a:srgbClr>
-            </a:outerShdw>
-          </a:effectLst>
+          <a:effectLst/>
         </p:spPr>
         <p:txBody>
-          <a:bodyPr anchor="ctr"/>
+          <a:bodyPr lIns="0" tIns="0" rIns="0" bIns="0" anchor="ctr"/>
           <a:lstStyle/>
           <a:p>
             <a:pPr algn="ctr" eaLnBrk="1" hangingPunct="1">
@@ -13043,30 +12984,21 @@
         </p:nvSpPr>
         <p:spPr bwMode="auto">
           <a:xfrm flipH="1">
-            <a:off x="192634" y="3031566"/>
+            <a:off x="143866" y="3616782"/>
             <a:ext cx="2560320" cy="640080"/>
           </a:xfrm>
-          <a:prstGeom prst="rect">
+          <a:prstGeom prst="roundRect">
             <a:avLst/>
           </a:prstGeom>
           <a:solidFill>
-            <a:schemeClr val="tx2">
-              <a:lumMod val="20000"/>
-              <a:lumOff val="80000"/>
-            </a:schemeClr>
+            <a:srgbClr val="FFFF00"/>
           </a:solidFill>
-          <a:ln>
+          <a:ln w="12700">
             <a:solidFill>
               <a:srgbClr val="4A7EBB"/>
             </a:solidFill>
           </a:ln>
-          <a:effectLst>
-            <a:outerShdw blurRad="63500" dist="38182" dir="2700000" rotWithShape="0">
-              <a:srgbClr val="000000">
-                <a:alpha val="39999"/>
-              </a:srgbClr>
-            </a:outerShdw>
-          </a:effectLst>
+          <a:effectLst/>
           <a:extLst>
             <a:ext uri="{91240B29-F687-4f45-9708-019B960494DF}">
               <a14:hiddenLine xmlns="" xmlns:a14="http://schemas.microsoft.com/office/drawing/2010/main" w="9525">
@@ -13081,7 +13013,7 @@
           </a:extLst>
         </p:spPr>
         <p:txBody>
-          <a:bodyPr lIns="81638" tIns="42452" rIns="81638" bIns="42452" anchor="ctr"/>
+          <a:bodyPr lIns="0" tIns="0" rIns="0" bIns="0" anchor="ctr"/>
           <a:lstStyle/>
           <a:p>
             <a:pPr algn="ctr" eaLnBrk="1" hangingPunct="1">
@@ -13091,7 +13023,7 @@
               <a:buSzPct val="25000"/>
             </a:pPr>
             <a:r>
-              <a:rPr lang="en-US" sz="1300" i="1" dirty="0">
+              <a:rPr lang="en-US" sz="1300" dirty="0">
                 <a:solidFill>
                   <a:srgbClr val="000000"/>
                 </a:solidFill>
@@ -13125,108 +13057,6 @@
           </a:p>
         </p:txBody>
       </p:sp>
-      <p:sp>
-        <p:nvSpPr>
-          <p:cNvPr id="43" name="Rectangle 42"/>
-          <p:cNvSpPr>
-            <a:spLocks noChangeArrowheads="1"/>
-          </p:cNvSpPr>
-          <p:nvPr/>
-        </p:nvSpPr>
-        <p:spPr bwMode="auto">
-          <a:xfrm>
-            <a:off x="192632" y="3982311"/>
-            <a:ext cx="2560320" cy="457200"/>
-          </a:xfrm>
-          <a:prstGeom prst="rect">
-            <a:avLst/>
-          </a:prstGeom>
-          <a:solidFill>
-            <a:srgbClr val="FFFF00"/>
-          </a:solidFill>
-          <a:ln w="9525">
-            <a:solidFill>
-              <a:srgbClr val="4A7EBB"/>
-            </a:solidFill>
-            <a:miter lim="800000"/>
-            <a:headEnd/>
-            <a:tailEnd/>
-          </a:ln>
-          <a:effectLst>
-            <a:outerShdw blurRad="40000" dist="23000" dir="5400000" rotWithShape="0">
-              <a:srgbClr val="000000">
-                <a:alpha val="34999"/>
-              </a:srgbClr>
-            </a:outerShdw>
-          </a:effectLst>
-        </p:spPr>
-        <p:txBody>
-          <a:bodyPr anchor="ctr"/>
-          <a:lstStyle/>
-          <a:p>
-            <a:pPr algn="ctr" eaLnBrk="1" hangingPunct="1">
-              <a:defRPr/>
-            </a:pPr>
-            <a:r>
-              <a:rPr lang="en-US" sz="1300" dirty="0">
-                <a:latin typeface="PT Sans" charset="-52"/>
-                <a:ea typeface="PT Sans" charset="-52"/>
-                <a:cs typeface="PT Sans" charset="-52"/>
-              </a:rPr>
-              <a:t>Ranked Gene List</a:t>
-            </a:r>
-          </a:p>
-          <a:p>
-            <a:pPr algn="ctr" eaLnBrk="1" hangingPunct="1">
-              <a:defRPr/>
-            </a:pPr>
-            <a:r>
-              <a:rPr lang="en-US" sz="1300" dirty="0">
-                <a:latin typeface="Consolas" charset="0"/>
-                <a:ea typeface="Consolas" charset="0"/>
-                <a:cs typeface="Consolas" charset="0"/>
-              </a:rPr>
-              <a:t>negative_binomial_results</a:t>
-            </a:r>
-          </a:p>
-        </p:txBody>
-      </p:sp>
-      <p:cxnSp>
-        <p:nvCxnSpPr>
-          <p:cNvPr id="4" name="Straight Arrow Connector 3"/>
-          <p:cNvCxnSpPr>
-            <a:stCxn id="42" idx="2"/>
-            <a:endCxn id="43" idx="0"/>
-          </p:cNvCxnSpPr>
-          <p:nvPr/>
-        </p:nvCxnSpPr>
-        <p:spPr>
-          <a:xfrm flipH="1">
-            <a:off x="1472792" y="3671646"/>
-            <a:ext cx="2" cy="310665"/>
-          </a:xfrm>
-          <a:prstGeom prst="straightConnector1">
-            <a:avLst/>
-          </a:prstGeom>
-          <a:ln>
-            <a:tailEnd type="triangle"/>
-          </a:ln>
-        </p:spPr>
-        <p:style>
-          <a:lnRef idx="2">
-            <a:schemeClr val="accent1"/>
-          </a:lnRef>
-          <a:fillRef idx="0">
-            <a:schemeClr val="accent1"/>
-          </a:fillRef>
-          <a:effectRef idx="1">
-            <a:schemeClr val="accent1"/>
-          </a:effectRef>
-          <a:fontRef idx="minor">
-            <a:schemeClr val="tx1"/>
-          </a:fontRef>
-        </p:style>
-      </p:cxnSp>
       <p:sp>
         <p:nvSpPr>
           <p:cNvPr id="44" name="Shape 137"/>
@@ -13237,30 +13067,21 @@
         </p:nvSpPr>
         <p:spPr bwMode="auto">
           <a:xfrm flipH="1">
-            <a:off x="3309046" y="3035153"/>
+            <a:off x="3260278" y="3620369"/>
             <a:ext cx="2560320" cy="640080"/>
           </a:xfrm>
-          <a:prstGeom prst="rect">
+          <a:prstGeom prst="roundRect">
             <a:avLst/>
           </a:prstGeom>
           <a:solidFill>
-            <a:schemeClr val="tx2">
-              <a:lumMod val="20000"/>
-              <a:lumOff val="80000"/>
-            </a:schemeClr>
+            <a:srgbClr val="FFFF00"/>
           </a:solidFill>
-          <a:ln>
+          <a:ln w="12700">
             <a:solidFill>
               <a:srgbClr val="4A7EBB"/>
             </a:solidFill>
           </a:ln>
-          <a:effectLst>
-            <a:outerShdw blurRad="63500" dist="38182" dir="2700000" rotWithShape="0">
-              <a:srgbClr val="000000">
-                <a:alpha val="39999"/>
-              </a:srgbClr>
-            </a:outerShdw>
-          </a:effectLst>
+          <a:effectLst/>
           <a:extLst>
             <a:ext uri="{91240B29-F687-4f45-9708-019B960494DF}">
               <a14:hiddenLine xmlns="" xmlns:a14="http://schemas.microsoft.com/office/drawing/2010/main" w="9525">
@@ -13275,7 +13096,7 @@
           </a:extLst>
         </p:spPr>
         <p:txBody>
-          <a:bodyPr lIns="81638" tIns="42452" rIns="81638" bIns="42452" anchor="ctr"/>
+          <a:bodyPr lIns="0" tIns="0" rIns="0" bIns="0" anchor="ctr"/>
           <a:lstStyle/>
           <a:p>
             <a:pPr algn="ctr" eaLnBrk="1" hangingPunct="1">
@@ -13285,7 +13106,7 @@
               <a:buSzPct val="25000"/>
             </a:pPr>
             <a:r>
-              <a:rPr lang="en-US" sz="1300" i="1" dirty="0">
+              <a:rPr lang="en-US" sz="1300" dirty="0">
                 <a:solidFill>
                   <a:srgbClr val="000000"/>
                 </a:solidFill>
@@ -13319,113 +13140,6 @@
           </a:p>
         </p:txBody>
       </p:sp>
-      <p:sp>
-        <p:nvSpPr>
-          <p:cNvPr id="49" name="Rectangle 48"/>
-          <p:cNvSpPr>
-            <a:spLocks noChangeArrowheads="1"/>
-          </p:cNvSpPr>
-          <p:nvPr/>
-        </p:nvSpPr>
-        <p:spPr bwMode="auto">
-          <a:xfrm>
-            <a:off x="3309046" y="3982311"/>
-            <a:ext cx="2560320" cy="457200"/>
-          </a:xfrm>
-          <a:prstGeom prst="rect">
-            <a:avLst/>
-          </a:prstGeom>
-          <a:solidFill>
-            <a:srgbClr val="FFFF00"/>
-          </a:solidFill>
-          <a:ln w="9525">
-            <a:solidFill>
-              <a:srgbClr val="4A7EBB"/>
-            </a:solidFill>
-            <a:miter lim="800000"/>
-            <a:headEnd/>
-            <a:tailEnd/>
-          </a:ln>
-          <a:effectLst>
-            <a:outerShdw blurRad="40000" dist="23000" dir="5400000" rotWithShape="0">
-              <a:srgbClr val="000000">
-                <a:alpha val="34999"/>
-              </a:srgbClr>
-            </a:outerShdw>
-          </a:effectLst>
-        </p:spPr>
-        <p:txBody>
-          <a:bodyPr anchor="ctr"/>
-          <a:lstStyle/>
-          <a:p>
-            <a:pPr algn="ctr" eaLnBrk="1" hangingPunct="1">
-              <a:defRPr/>
-            </a:pPr>
-            <a:r>
-              <a:rPr lang="en-US" sz="1300" dirty="0">
-                <a:latin typeface="PT Sans" charset="-52"/>
-                <a:ea typeface="PT Sans" charset="-52"/>
-                <a:cs typeface="PT Sans" charset="-52"/>
-              </a:rPr>
-              <a:t>Ranked Gene List</a:t>
-            </a:r>
-          </a:p>
-          <a:p>
-            <a:pPr algn="ctr" eaLnBrk="1" hangingPunct="1">
-              <a:defRPr/>
-            </a:pPr>
-            <a:r>
-              <a:rPr lang="en-US" sz="1300" dirty="0">
-                <a:latin typeface="Consolas" charset="0"/>
-                <a:ea typeface="Consolas" charset="0"/>
-                <a:cs typeface="Consolas" charset="0"/>
-              </a:rPr>
-              <a:t>naive_normal_results</a:t>
-            </a:r>
-            <a:endParaRPr lang="en-US" sz="1300" dirty="0">
-              <a:latin typeface="PT Sans" charset="-52"/>
-              <a:ea typeface="PT Sans" charset="-52"/>
-              <a:cs typeface="PT Sans" charset="-52"/>
-            </a:endParaRPr>
-          </a:p>
-        </p:txBody>
-      </p:sp>
-      <p:cxnSp>
-        <p:nvCxnSpPr>
-          <p:cNvPr id="11" name="Straight Arrow Connector 10"/>
-          <p:cNvCxnSpPr>
-            <a:stCxn id="44" idx="2"/>
-            <a:endCxn id="49" idx="0"/>
-          </p:cNvCxnSpPr>
-          <p:nvPr/>
-        </p:nvCxnSpPr>
-        <p:spPr>
-          <a:xfrm>
-            <a:off x="4589206" y="3675233"/>
-            <a:ext cx="0" cy="307078"/>
-          </a:xfrm>
-          <a:prstGeom prst="straightConnector1">
-            <a:avLst/>
-          </a:prstGeom>
-          <a:ln>
-            <a:tailEnd type="triangle"/>
-          </a:ln>
-        </p:spPr>
-        <p:style>
-          <a:lnRef idx="2">
-            <a:schemeClr val="accent1"/>
-          </a:lnRef>
-          <a:fillRef idx="0">
-            <a:schemeClr val="accent1"/>
-          </a:fillRef>
-          <a:effectRef idx="1">
-            <a:schemeClr val="accent1"/>
-          </a:effectRef>
-          <a:fontRef idx="minor">
-            <a:schemeClr val="tx1"/>
-          </a:fontRef>
-        </p:style>
-      </p:cxnSp>
       <p:sp>
         <p:nvSpPr>
           <p:cNvPr id="57" name="Shape 137"/>
@@ -13436,30 +13150,21 @@
         </p:nvSpPr>
         <p:spPr bwMode="auto">
           <a:xfrm flipH="1">
-            <a:off x="6425657" y="3031566"/>
+            <a:off x="6376889" y="3616782"/>
             <a:ext cx="2560320" cy="640080"/>
           </a:xfrm>
-          <a:prstGeom prst="rect">
+          <a:prstGeom prst="roundRect">
             <a:avLst/>
           </a:prstGeom>
           <a:solidFill>
-            <a:schemeClr val="tx2">
-              <a:lumMod val="20000"/>
-              <a:lumOff val="80000"/>
-            </a:schemeClr>
+            <a:srgbClr val="FFFF00"/>
           </a:solidFill>
-          <a:ln>
+          <a:ln w="12700">
             <a:solidFill>
               <a:srgbClr val="4A7EBB"/>
             </a:solidFill>
           </a:ln>
-          <a:effectLst>
-            <a:outerShdw blurRad="63500" dist="38182" dir="2700000" rotWithShape="0">
-              <a:srgbClr val="000000">
-                <a:alpha val="39999"/>
-              </a:srgbClr>
-            </a:outerShdw>
-          </a:effectLst>
+          <a:effectLst/>
           <a:extLst>
             <a:ext uri="{91240B29-F687-4f45-9708-019B960494DF}">
               <a14:hiddenLine xmlns="" xmlns:a14="http://schemas.microsoft.com/office/drawing/2010/main" w="9525">
@@ -13474,7 +13179,7 @@
           </a:extLst>
         </p:spPr>
         <p:txBody>
-          <a:bodyPr lIns="81638" tIns="42452" rIns="81638" bIns="42452" anchor="ctr"/>
+          <a:bodyPr lIns="0" tIns="0" rIns="0" bIns="0" anchor="ctr"/>
           <a:lstStyle/>
           <a:p>
             <a:pPr algn="ctr" eaLnBrk="1" hangingPunct="1">
@@ -13484,7 +13189,7 @@
               <a:buSzPct val="25000"/>
             </a:pPr>
             <a:r>
-              <a:rPr lang="en-US" sz="1300" i="1" dirty="0">
+              <a:rPr lang="en-US" sz="1300" dirty="0">
                 <a:solidFill>
                   <a:srgbClr val="000000"/>
                 </a:solidFill>
@@ -13520,7 +13225,7 @@
       </p:sp>
       <p:sp>
         <p:nvSpPr>
-          <p:cNvPr id="62" name="Rectangle 61"/>
+          <p:cNvPr id="62" name="Rounded Rectangle 61"/>
           <p:cNvSpPr>
             <a:spLocks noChangeArrowheads="1"/>
           </p:cNvSpPr>
@@ -13528,33 +13233,25 @@
         </p:nvSpPr>
         <p:spPr bwMode="auto">
           <a:xfrm>
-            <a:off x="6425459" y="3988524"/>
+            <a:off x="6376691" y="4573740"/>
             <a:ext cx="2560320" cy="457200"/>
           </a:xfrm>
-          <a:prstGeom prst="rect">
+          <a:prstGeom prst="roundRect">
             <a:avLst/>
           </a:prstGeom>
-          <a:solidFill>
-            <a:srgbClr val="FFFF00"/>
-          </a:solidFill>
-          <a:ln w="9525">
+          <a:noFill/>
+          <a:ln w="12700">
             <a:solidFill>
-              <a:srgbClr val="4A7EBB"/>
+              <a:schemeClr val="tx1"/>
             </a:solidFill>
             <a:miter lim="800000"/>
             <a:headEnd/>
             <a:tailEnd/>
           </a:ln>
-          <a:effectLst>
-            <a:outerShdw blurRad="40000" dist="23000" dir="5400000" rotWithShape="0">
-              <a:srgbClr val="000000">
-                <a:alpha val="34999"/>
-              </a:srgbClr>
-            </a:outerShdw>
-          </a:effectLst>
+          <a:effectLst/>
         </p:spPr>
         <p:txBody>
-          <a:bodyPr anchor="ctr"/>
+          <a:bodyPr lIns="0" tIns="0" rIns="0" bIns="0" anchor="ctr"/>
           <a:lstStyle/>
           <a:p>
             <a:pPr algn="ctr" eaLnBrk="1" hangingPunct="1">
@@ -13615,30 +13312,21 @@
         </p:nvSpPr>
         <p:spPr bwMode="auto">
           <a:xfrm flipH="1">
-            <a:off x="6425459" y="4762602"/>
+            <a:off x="6376691" y="5347818"/>
             <a:ext cx="2560320" cy="640080"/>
           </a:xfrm>
-          <a:prstGeom prst="rect">
+          <a:prstGeom prst="roundRect">
             <a:avLst/>
           </a:prstGeom>
           <a:solidFill>
-            <a:schemeClr val="tx2">
-              <a:lumMod val="20000"/>
-              <a:lumOff val="80000"/>
-            </a:schemeClr>
+            <a:srgbClr val="FFFF00"/>
           </a:solidFill>
-          <a:ln>
+          <a:ln w="12700">
             <a:solidFill>
               <a:srgbClr val="4A7EBB"/>
             </a:solidFill>
           </a:ln>
-          <a:effectLst>
-            <a:outerShdw blurRad="63500" dist="38182" dir="2700000" rotWithShape="0">
-              <a:srgbClr val="000000">
-                <a:alpha val="39999"/>
-              </a:srgbClr>
-            </a:outerShdw>
-          </a:effectLst>
+          <a:effectLst/>
           <a:extLst>
             <a:ext uri="{91240B29-F687-4f45-9708-019B960494DF}">
               <a14:hiddenLine xmlns="" xmlns:a14="http://schemas.microsoft.com/office/drawing/2010/main" w="9525">
@@ -13653,7 +13341,7 @@
           </a:extLst>
         </p:spPr>
         <p:txBody>
-          <a:bodyPr lIns="81638" tIns="42452" rIns="81638" bIns="42452" anchor="ctr"/>
+          <a:bodyPr lIns="0" tIns="0" rIns="0" bIns="0" anchor="ctr"/>
           <a:lstStyle/>
           <a:p>
             <a:pPr algn="ctr" eaLnBrk="1" hangingPunct="1">
@@ -13663,7 +13351,7 @@
               <a:buSzPct val="25000"/>
             </a:pPr>
             <a:r>
-              <a:rPr lang="en-US" sz="1300" i="1" dirty="0">
+              <a:rPr lang="en-US" sz="1300" dirty="0">
                 <a:solidFill>
                   <a:srgbClr val="000000"/>
                 </a:solidFill>
@@ -13697,125 +13385,15 @@
           </a:p>
         </p:txBody>
       </p:sp>
-      <p:sp>
-        <p:nvSpPr>
-          <p:cNvPr id="69" name="Rectangle 68"/>
-          <p:cNvSpPr>
-            <a:spLocks noChangeArrowheads="1"/>
-          </p:cNvSpPr>
-          <p:nvPr/>
-        </p:nvSpPr>
-        <p:spPr bwMode="auto">
-          <a:xfrm>
-            <a:off x="6425459" y="5719559"/>
-            <a:ext cx="2560320" cy="457200"/>
-          </a:xfrm>
-          <a:prstGeom prst="rect">
-            <a:avLst/>
-          </a:prstGeom>
-          <a:solidFill>
-            <a:srgbClr val="FFFF00"/>
-          </a:solidFill>
-          <a:ln w="9525">
-            <a:solidFill>
-              <a:srgbClr val="4A7EBB"/>
-            </a:solidFill>
-            <a:miter lim="800000"/>
-            <a:headEnd/>
-            <a:tailEnd/>
-          </a:ln>
-          <a:effectLst>
-            <a:outerShdw blurRad="40000" dist="23000" dir="5400000" rotWithShape="0">
-              <a:srgbClr val="000000">
-                <a:alpha val="34999"/>
-              </a:srgbClr>
-            </a:outerShdw>
-          </a:effectLst>
-        </p:spPr>
-        <p:txBody>
-          <a:bodyPr anchor="ctr"/>
-          <a:lstStyle/>
-          <a:p>
-            <a:pPr algn="ctr" eaLnBrk="1" hangingPunct="1">
-              <a:defRPr/>
-            </a:pPr>
-            <a:r>
-              <a:rPr lang="en-US" sz="1300" dirty="0">
-                <a:latin typeface="PT Sans" charset="-52"/>
-                <a:ea typeface="PT Sans" charset="-52"/>
-                <a:cs typeface="PT Sans" charset="-52"/>
-              </a:rPr>
-              <a:t>Ranked Gene List</a:t>
-            </a:r>
-          </a:p>
-          <a:p>
-            <a:pPr algn="ctr" eaLnBrk="1" hangingPunct="1">
-              <a:defRPr/>
-            </a:pPr>
-            <a:r>
-              <a:rPr lang="en-US" sz="1300" dirty="0">
-                <a:latin typeface="Consolas" charset="0"/>
-                <a:ea typeface="Consolas" charset="0"/>
-                <a:cs typeface="Consolas" charset="0"/>
-              </a:rPr>
-              <a:t>transformed_normal_results</a:t>
-            </a:r>
-            <a:endParaRPr lang="en-US" sz="1300" dirty="0">
-              <a:latin typeface="PT Sans" charset="-52"/>
-              <a:ea typeface="PT Sans" charset="-52"/>
-              <a:cs typeface="PT Sans" charset="-52"/>
-            </a:endParaRPr>
-          </a:p>
-        </p:txBody>
-      </p:sp>
       <p:cxnSp>
         <p:nvCxnSpPr>
-          <p:cNvPr id="70" name="Straight Arrow Connector 69"/>
-          <p:cNvCxnSpPr>
-            <a:stCxn id="68" idx="2"/>
-            <a:endCxn id="69" idx="0"/>
-          </p:cNvCxnSpPr>
+          <p:cNvPr id="24" name="Straight Arrow Connector 23"/>
+          <p:cNvCxnSpPr/>
           <p:nvPr/>
         </p:nvCxnSpPr>
         <p:spPr>
           <a:xfrm>
-            <a:off x="7705619" y="5402682"/>
-            <a:ext cx="0" cy="316877"/>
-          </a:xfrm>
-          <a:prstGeom prst="straightConnector1">
-            <a:avLst/>
-          </a:prstGeom>
-          <a:ln>
-            <a:tailEnd type="triangle"/>
-          </a:ln>
-        </p:spPr>
-        <p:style>
-          <a:lnRef idx="2">
-            <a:schemeClr val="accent1"/>
-          </a:lnRef>
-          <a:fillRef idx="0">
-            <a:schemeClr val="accent1"/>
-          </a:fillRef>
-          <a:effectRef idx="1">
-            <a:schemeClr val="accent1"/>
-          </a:effectRef>
-          <a:fontRef idx="minor">
-            <a:schemeClr val="tx1"/>
-          </a:fontRef>
-        </p:style>
-      </p:cxnSp>
-      <p:cxnSp>
-        <p:nvCxnSpPr>
-          <p:cNvPr id="24" name="Straight Arrow Connector 23"/>
-          <p:cNvCxnSpPr>
-            <a:stCxn id="62" idx="2"/>
-            <a:endCxn id="68" idx="0"/>
-          </p:cNvCxnSpPr>
-          <p:nvPr/>
-        </p:nvCxnSpPr>
-        <p:spPr>
-          <a:xfrm>
-            <a:off x="7705619" y="4445724"/>
+            <a:off x="7656851" y="5030940"/>
             <a:ext cx="0" cy="316878"/>
           </a:xfrm>
           <a:prstGeom prst="straightConnector1">
@@ -13824,6 +13402,7 @@
           <a:ln w="63500" cmpd="dbl">
             <a:tailEnd type="triangle"/>
           </a:ln>
+          <a:effectLst/>
         </p:spPr>
         <p:style>
           <a:lnRef idx="2">
@@ -13843,15 +13422,12 @@
       <p:cxnSp>
         <p:nvCxnSpPr>
           <p:cNvPr id="28" name="Straight Arrow Connector 27"/>
-          <p:cNvCxnSpPr>
-            <a:stCxn id="57" idx="2"/>
-            <a:endCxn id="62" idx="0"/>
-          </p:cNvCxnSpPr>
+          <p:cNvCxnSpPr/>
           <p:nvPr/>
         </p:nvCxnSpPr>
         <p:spPr>
           <a:xfrm flipH="1">
-            <a:off x="7705619" y="3671646"/>
+            <a:off x="7656851" y="4256862"/>
             <a:ext cx="198" cy="316878"/>
           </a:xfrm>
           <a:prstGeom prst="straightConnector1">
@@ -13860,6 +13436,7 @@
           <a:ln w="63500" cmpd="dbl">
             <a:tailEnd type="triangle"/>
           </a:ln>
+          <a:effectLst/>
         </p:spPr>
         <p:style>
           <a:lnRef idx="2">
@@ -13884,12 +13461,13 @@
         </p:nvSpPr>
         <p:spPr>
           <a:xfrm>
-            <a:off x="4467647" y="2117069"/>
+            <a:off x="4418879" y="2702285"/>
             <a:ext cx="243118" cy="245533"/>
           </a:xfrm>
           <a:prstGeom prst="ellipse">
             <a:avLst/>
           </a:prstGeom>
+          <a:effectLst/>
         </p:spPr>
         <p:style>
           <a:lnRef idx="1">
@@ -13928,14 +13506,13 @@
         <p:nvCxnSpPr>
           <p:cNvPr id="45" name="Elbow Connector 44"/>
           <p:cNvCxnSpPr>
-            <a:stCxn id="34" idx="2"/>
             <a:endCxn id="32" idx="6"/>
           </p:cNvCxnSpPr>
           <p:nvPr/>
         </p:nvCxnSpPr>
         <p:spPr>
           <a:xfrm rot="5400000">
-            <a:off x="5505588" y="1319966"/>
+            <a:off x="5456820" y="1905182"/>
             <a:ext cx="125048" cy="1714693"/>
           </a:xfrm>
           <a:prstGeom prst="bentConnector2">
@@ -13944,6 +13521,7 @@
           <a:ln>
             <a:tailEnd type="triangle"/>
           </a:ln>
+          <a:effectLst/>
         </p:spPr>
         <p:style>
           <a:lnRef idx="2">
@@ -13964,14 +13542,13 @@
         <p:nvCxnSpPr>
           <p:cNvPr id="48" name="Elbow Connector 47"/>
           <p:cNvCxnSpPr>
-            <a:stCxn id="40" idx="2"/>
             <a:endCxn id="32" idx="2"/>
           </p:cNvCxnSpPr>
           <p:nvPr/>
         </p:nvCxnSpPr>
         <p:spPr>
           <a:xfrm rot="16200000" flipH="1">
-            <a:off x="3504794" y="1276982"/>
+            <a:off x="3456026" y="1862198"/>
             <a:ext cx="119573" cy="1806134"/>
           </a:xfrm>
           <a:prstGeom prst="bentConnector2">
@@ -13980,6 +13557,7 @@
           <a:ln>
             <a:tailEnd type="triangle"/>
           </a:ln>
+          <a:effectLst/>
         </p:spPr>
         <p:style>
           <a:lnRef idx="2">
@@ -13999,15 +13577,12 @@
       <p:cxnSp>
         <p:nvCxnSpPr>
           <p:cNvPr id="63" name="Straight Arrow Connector 62"/>
-          <p:cNvCxnSpPr>
-            <a:stCxn id="38" idx="2"/>
-            <a:endCxn id="136" idx="0"/>
-          </p:cNvCxnSpPr>
+          <p:cNvCxnSpPr/>
           <p:nvPr/>
         </p:nvCxnSpPr>
         <p:spPr>
           <a:xfrm flipH="1">
-            <a:off x="2661512" y="603373"/>
+            <a:off x="2612744" y="1188589"/>
             <a:ext cx="2" cy="207845"/>
           </a:xfrm>
           <a:prstGeom prst="straightConnector1">
@@ -14016,6 +13591,7 @@
           <a:ln>
             <a:tailEnd type="triangle"/>
           </a:ln>
+          <a:effectLst/>
         </p:spPr>
         <p:style>
           <a:lnRef idx="2">
@@ -14035,15 +13611,12 @@
       <p:cxnSp>
         <p:nvCxnSpPr>
           <p:cNvPr id="11265" name="Straight Arrow Connector 11264"/>
-          <p:cNvCxnSpPr>
-            <a:stCxn id="136" idx="2"/>
-            <a:endCxn id="40" idx="0"/>
-          </p:cNvCxnSpPr>
+          <p:cNvCxnSpPr/>
           <p:nvPr/>
         </p:nvCxnSpPr>
         <p:spPr>
           <a:xfrm>
-            <a:off x="2661512" y="1451298"/>
+            <a:off x="2612744" y="2036514"/>
             <a:ext cx="1" cy="211765"/>
           </a:xfrm>
           <a:prstGeom prst="straightConnector1">
@@ -14052,6 +13625,7 @@
           <a:ln>
             <a:tailEnd type="triangle"/>
           </a:ln>
+          <a:effectLst/>
         </p:spPr>
         <p:style>
           <a:lnRef idx="2">
@@ -14071,15 +13645,12 @@
       <p:cxnSp>
         <p:nvCxnSpPr>
           <p:cNvPr id="11272" name="Straight Arrow Connector 11271"/>
-          <p:cNvCxnSpPr>
-            <a:stCxn id="35" idx="2"/>
-            <a:endCxn id="39" idx="0"/>
-          </p:cNvCxnSpPr>
+          <p:cNvCxnSpPr/>
           <p:nvPr/>
         </p:nvCxnSpPr>
         <p:spPr>
           <a:xfrm flipH="1">
-            <a:off x="6425458" y="604929"/>
+            <a:off x="6376690" y="1190145"/>
             <a:ext cx="1" cy="206289"/>
           </a:xfrm>
           <a:prstGeom prst="straightConnector1">
@@ -14088,6 +13659,7 @@
           <a:ln>
             <a:tailEnd type="triangle"/>
           </a:ln>
+          <a:effectLst/>
         </p:spPr>
         <p:style>
           <a:lnRef idx="2">
@@ -14107,15 +13679,12 @@
       <p:cxnSp>
         <p:nvCxnSpPr>
           <p:cNvPr id="11274" name="Straight Arrow Connector 11273"/>
-          <p:cNvCxnSpPr>
-            <a:stCxn id="39" idx="2"/>
-            <a:endCxn id="34" idx="0"/>
-          </p:cNvCxnSpPr>
+          <p:cNvCxnSpPr/>
           <p:nvPr/>
         </p:nvCxnSpPr>
         <p:spPr>
           <a:xfrm>
-            <a:off x="6425458" y="1451298"/>
+            <a:off x="6376690" y="2036514"/>
             <a:ext cx="0" cy="206290"/>
           </a:xfrm>
           <a:prstGeom prst="straightConnector1">
@@ -14124,6 +13693,7 @@
           <a:ln>
             <a:tailEnd type="triangle"/>
           </a:ln>
+          <a:effectLst/>
         </p:spPr>
         <p:style>
           <a:lnRef idx="2">
@@ -14145,13 +13715,12 @@
           <p:cNvPr id="168" name="Elbow Connector 167"/>
           <p:cNvCxnSpPr>
             <a:stCxn id="32" idx="4"/>
-            <a:endCxn id="42" idx="0"/>
           </p:cNvCxnSpPr>
           <p:nvPr/>
         </p:nvCxnSpPr>
         <p:spPr>
           <a:xfrm rot="5400000">
-            <a:off x="2696518" y="1138878"/>
+            <a:off x="2647750" y="1724094"/>
             <a:ext cx="668964" cy="3116412"/>
           </a:xfrm>
           <a:prstGeom prst="bentConnector3">
@@ -14162,6 +13731,7 @@
           <a:ln w="63500" cmpd="dbl">
             <a:tailEnd type="triangle"/>
           </a:ln>
+          <a:effectLst/>
         </p:spPr>
         <p:style>
           <a:lnRef idx="2">
@@ -14183,13 +13753,12 @@
           <p:cNvPr id="170" name="Elbow Connector 169"/>
           <p:cNvCxnSpPr>
             <a:stCxn id="32" idx="4"/>
-            <a:endCxn id="57" idx="0"/>
           </p:cNvCxnSpPr>
           <p:nvPr/>
         </p:nvCxnSpPr>
         <p:spPr>
           <a:xfrm rot="16200000" flipH="1">
-            <a:off x="5813029" y="1138778"/>
+            <a:off x="5764261" y="1723994"/>
             <a:ext cx="668964" cy="3116611"/>
           </a:xfrm>
           <a:prstGeom prst="bentConnector3">
@@ -14200,6 +13769,7 @@
           <a:ln w="63500" cmpd="dbl">
             <a:tailEnd type="triangle"/>
           </a:ln>
+          <a:effectLst/>
         </p:spPr>
         <p:style>
           <a:lnRef idx="2">
@@ -14221,13 +13791,12 @@
           <p:cNvPr id="11335" name="Straight Arrow Connector 11334"/>
           <p:cNvCxnSpPr>
             <a:stCxn id="32" idx="4"/>
-            <a:endCxn id="44" idx="0"/>
           </p:cNvCxnSpPr>
           <p:nvPr/>
         </p:nvCxnSpPr>
         <p:spPr>
           <a:xfrm>
-            <a:off x="4589206" y="2362602"/>
+            <a:off x="4540438" y="2947818"/>
             <a:ext cx="0" cy="672551"/>
           </a:xfrm>
           <a:prstGeom prst="straightConnector1">
@@ -14236,6 +13805,7 @@
           <a:ln w="63500" cmpd="dbl">
             <a:tailEnd type="triangle"/>
           </a:ln>
+          <a:effectLst/>
         </p:spPr>
         <p:style>
           <a:lnRef idx="2">
@@ -14254,7 +13824,13 @@
       </p:cxnSp>
       <p:sp>
         <p:nvSpPr>
-          <p:cNvPr id="36" name="Rectangle 35"/>
+          <p:cNvPr id="54" name="Rounded Rectangle 53">
+            <a:extLst>
+              <a:ext uri="{FF2B5EF4-FFF2-40B4-BE49-F238E27FC236}">
+                <a16:creationId xmlns:a16="http://schemas.microsoft.com/office/drawing/2014/main" id="{841C45CD-A69B-D946-A964-2B661650E8C8}"/>
+              </a:ext>
+            </a:extLst>
+          </p:cNvPr>
           <p:cNvSpPr>
             <a:spLocks noChangeArrowheads="1"/>
           </p:cNvSpPr>
@@ -14265,7 +13841,7 @@
             <a:off x="192632" y="4767140"/>
             <a:ext cx="2728986" cy="640080"/>
           </a:xfrm>
-          <a:prstGeom prst="rect">
+          <a:prstGeom prst="roundRect">
             <a:avLst/>
           </a:prstGeom>
           <a:solidFill>
@@ -14284,23 +13860,17 @@
             <a:headEnd/>
             <a:tailEnd/>
           </a:ln>
-          <a:effectLst>
-            <a:outerShdw blurRad="40000" dist="23000" dir="5400000" rotWithShape="0">
-              <a:srgbClr val="000000">
-                <a:alpha val="34999"/>
-              </a:srgbClr>
-            </a:outerShdw>
-          </a:effectLst>
+          <a:effectLst/>
         </p:spPr>
         <p:txBody>
-          <a:bodyPr anchor="ctr"/>
+          <a:bodyPr lIns="0" tIns="0" rIns="0" bIns="0" anchor="ctr"/>
           <a:lstStyle/>
           <a:p>
             <a:pPr algn="ctr" eaLnBrk="1" hangingPunct="1">
               <a:defRPr/>
             </a:pPr>
             <a:r>
-              <a:rPr lang="en-US" sz="1300" i="1" dirty="0">
+              <a:rPr lang="en-US" sz="1300" dirty="0">
                 <a:latin typeface="PT Sans" charset="-52"/>
                 <a:ea typeface="PT Sans" charset="-52"/>
                 <a:cs typeface="PT Sans" charset="-52"/>
@@ -14325,7 +13895,13 @@
       </p:sp>
       <p:sp>
         <p:nvSpPr>
-          <p:cNvPr id="47" name="Rectangle 46"/>
+          <p:cNvPr id="55" name="Rounded Rectangle 54">
+            <a:extLst>
+              <a:ext uri="{FF2B5EF4-FFF2-40B4-BE49-F238E27FC236}">
+                <a16:creationId xmlns:a16="http://schemas.microsoft.com/office/drawing/2014/main" id="{47CED92E-85EF-EB44-8B32-65200EE350A0}"/>
+              </a:ext>
+            </a:extLst>
+          </p:cNvPr>
           <p:cNvSpPr>
             <a:spLocks noChangeArrowheads="1"/>
           </p:cNvSpPr>
@@ -14336,7 +13912,7 @@
             <a:off x="192632" y="5632657"/>
             <a:ext cx="2728986" cy="640080"/>
           </a:xfrm>
-          <a:prstGeom prst="rect">
+          <a:prstGeom prst="roundRect">
             <a:avLst/>
           </a:prstGeom>
           <a:solidFill>
@@ -14355,29 +13931,36 @@
             <a:headEnd/>
             <a:tailEnd/>
           </a:ln>
-          <a:effectLst>
-            <a:outerShdw blurRad="40000" dist="23000" dir="5400000" rotWithShape="0">
-              <a:srgbClr val="000000">
-                <a:alpha val="34999"/>
-              </a:srgbClr>
-            </a:outerShdw>
-          </a:effectLst>
+          <a:effectLst/>
         </p:spPr>
         <p:txBody>
-          <a:bodyPr anchor="ctr"/>
+          <a:bodyPr lIns="0" tIns="0" rIns="0" bIns="0" anchor="ctr"/>
           <a:lstStyle/>
           <a:p>
             <a:pPr algn="ctr" eaLnBrk="1" hangingPunct="1">
               <a:defRPr/>
             </a:pPr>
             <a:r>
-              <a:rPr lang="en-US" sz="1300" i="1" dirty="0">
+              <a:rPr lang="en-US" sz="1300" dirty="0">
                 <a:latin typeface="PT Sans" charset="-52"/>
                 <a:ea typeface="PT Sans" charset="-52"/>
                 <a:cs typeface="PT Sans" charset="-52"/>
               </a:rPr>
-              <a:t>Cluster samples based on HTSeq counts</a:t>
-            </a:r>
+              <a:t>Cluster samples based on raw </a:t>
+            </a:r>
+            <a:r>
+              <a:rPr lang="en-US" sz="1300" dirty="0" err="1">
+                <a:latin typeface="PT Sans" charset="-52"/>
+                <a:ea typeface="PT Sans" charset="-52"/>
+                <a:cs typeface="PT Sans" charset="-52"/>
+              </a:rPr>
+              <a:t>HTSeqncounts</a:t>
+            </a:r>
+            <a:endParaRPr lang="en-US" sz="1300" dirty="0">
+              <a:latin typeface="PT Sans" charset="-52"/>
+              <a:ea typeface="PT Sans" charset="-52"/>
+              <a:cs typeface="PT Sans" charset="-52"/>
+            </a:endParaRPr>
           </a:p>
           <a:p>
             <a:pPr algn="ctr" eaLnBrk="1" hangingPunct="1">
@@ -14396,17 +13979,23 @@
       </p:sp>
       <p:cxnSp>
         <p:nvCxnSpPr>
-          <p:cNvPr id="21" name="Elbow Connector 20"/>
+          <p:cNvPr id="56" name="Elbow Connector 55">
+            <a:extLst>
+              <a:ext uri="{FF2B5EF4-FFF2-40B4-BE49-F238E27FC236}">
+                <a16:creationId xmlns:a16="http://schemas.microsoft.com/office/drawing/2014/main" id="{164A02DB-CA73-6245-B208-CAB71C1C63C6}"/>
+              </a:ext>
+            </a:extLst>
+          </p:cNvPr>
           <p:cNvCxnSpPr>
-            <a:stCxn id="49" idx="2"/>
-            <a:endCxn id="36" idx="3"/>
+            <a:cxnSpLocks/>
+            <a:stCxn id="44" idx="2"/>
           </p:cNvCxnSpPr>
           <p:nvPr/>
         </p:nvCxnSpPr>
         <p:spPr>
           <a:xfrm rot="5400000">
-            <a:off x="3431578" y="3929551"/>
-            <a:ext cx="647669" cy="1667588"/>
+            <a:off x="3317663" y="3864404"/>
+            <a:ext cx="826731" cy="1618820"/>
           </a:xfrm>
           <a:prstGeom prst="bentConnector2">
             <a:avLst/>
@@ -14419,6 +14008,7 @@
             </a:solidFill>
             <a:tailEnd type="triangle"/>
           </a:ln>
+          <a:effectLst/>
         </p:spPr>
         <p:style>
           <a:lnRef idx="2">
@@ -14437,17 +14027,23 @@
       </p:cxnSp>
       <p:cxnSp>
         <p:nvCxnSpPr>
-          <p:cNvPr id="23" name="Elbow Connector 22"/>
+          <p:cNvPr id="58" name="Elbow Connector 57">
+            <a:extLst>
+              <a:ext uri="{FF2B5EF4-FFF2-40B4-BE49-F238E27FC236}">
+                <a16:creationId xmlns:a16="http://schemas.microsoft.com/office/drawing/2014/main" id="{F672C35D-277D-9540-867A-C7E009E27204}"/>
+              </a:ext>
+            </a:extLst>
+          </p:cNvPr>
           <p:cNvCxnSpPr>
-            <a:stCxn id="49" idx="2"/>
-            <a:endCxn id="47" idx="3"/>
+            <a:cxnSpLocks/>
+            <a:stCxn id="44" idx="2"/>
           </p:cNvCxnSpPr>
           <p:nvPr/>
         </p:nvCxnSpPr>
         <p:spPr>
           <a:xfrm rot="5400000">
-            <a:off x="2998819" y="4362310"/>
-            <a:ext cx="1513186" cy="1667588"/>
+            <a:off x="2884904" y="4297163"/>
+            <a:ext cx="1692248" cy="1618820"/>
           </a:xfrm>
           <a:prstGeom prst="bentConnector2">
             <a:avLst/>
@@ -14478,7 +14074,13 @@
       </p:cxnSp>
       <p:sp>
         <p:nvSpPr>
-          <p:cNvPr id="27" name="TextBox 26"/>
+          <p:cNvPr id="59" name="TextBox 58">
+            <a:extLst>
+              <a:ext uri="{FF2B5EF4-FFF2-40B4-BE49-F238E27FC236}">
+                <a16:creationId xmlns:a16="http://schemas.microsoft.com/office/drawing/2014/main" id="{8C19F604-CA13-2948-A794-294918ACB4BA}"/>
+              </a:ext>
+            </a:extLst>
+          </p:cNvPr>
           <p:cNvSpPr txBox="1"/>
           <p:nvPr/>
         </p:nvSpPr>
@@ -14491,6 +14093,7 @@
             <a:avLst/>
           </a:prstGeom>
           <a:noFill/>
+          <a:effectLst/>
         </p:spPr>
         <p:txBody>
           <a:bodyPr wrap="square" rtlCol="0">
@@ -14517,7 +14120,7 @@
     </p:spTree>
     <p:extLst>
       <p:ext uri="{BB962C8B-B14F-4D97-AF65-F5344CB8AC3E}">
-        <p14:creationId xmlns:p14="http://schemas.microsoft.com/office/powerpoint/2010/main" val="1290424233"/>
+        <p14:creationId xmlns:p14="http://schemas.microsoft.com/office/powerpoint/2010/main" val="2947228976"/>
       </p:ext>
     </p:extLst>
   </p:cSld>
@@ -14546,6 +14149,106 @@
       </p:grpSpPr>
       <p:sp>
         <p:nvSpPr>
+          <p:cNvPr id="132" name="Shape 132"/>
+          <p:cNvSpPr txBox="1"/>
+          <p:nvPr/>
+        </p:nvSpPr>
+        <p:spPr>
+          <a:xfrm>
+            <a:off x="1530350" y="267495"/>
+            <a:ext cx="7370763" cy="355599"/>
+          </a:xfrm>
+          <a:prstGeom prst="rect">
+            <a:avLst/>
+          </a:prstGeom>
+          <a:noFill/>
+          <a:ln>
+            <a:noFill/>
+          </a:ln>
+          <a:effectLst/>
+        </p:spPr>
+        <p:txBody>
+          <a:bodyPr lIns="0" tIns="0" rIns="0" bIns="0" anchor="ctr"/>
+          <a:lstStyle/>
+          <a:p>
+            <a:pPr eaLnBrk="1" hangingPunct="1">
+              <a:spcBef>
+                <a:spcPts val="0"/>
+              </a:spcBef>
+              <a:buSzPct val="25000"/>
+              <a:defRPr/>
+            </a:pPr>
+            <a:r>
+              <a:rPr lang="en-US" sz="2800" b="1" dirty="0">
+                <a:solidFill>
+                  <a:srgbClr val="050505"/>
+                </a:solidFill>
+                <a:latin typeface="PT Serif" charset="0"/>
+                <a:ea typeface="PT Serif" charset="0"/>
+                <a:cs typeface="PT Serif" charset="0"/>
+                <a:sym typeface="Arial"/>
+              </a:rPr>
+              <a:t>Analyzing HTSeq Data Using GenePattern</a:t>
+            </a:r>
+          </a:p>
+        </p:txBody>
+      </p:sp>
+      <p:pic>
+        <p:nvPicPr>
+          <p:cNvPr id="11270" name="Shape 133"/>
+          <p:cNvPicPr preferRelativeResize="0">
+            <a:picLocks noChangeAspect="1" noChangeArrowheads="1"/>
+          </p:cNvPicPr>
+          <p:nvPr/>
+        </p:nvPicPr>
+        <p:blipFill>
+          <a:blip r:embed="rId3">
+            <a:extLst>
+              <a:ext uri="{28A0092B-C50C-407E-A947-70E740481C1C}">
+                <a14:useLocalDpi xmlns:a14="http://schemas.microsoft.com/office/drawing/2010/main" val="0"/>
+              </a:ext>
+            </a:extLst>
+          </a:blip>
+          <a:srcRect/>
+          <a:stretch>
+            <a:fillRect/>
+          </a:stretch>
+        </p:blipFill>
+        <p:spPr bwMode="auto">
+          <a:xfrm>
+            <a:off x="463605" y="-18047"/>
+            <a:ext cx="889000" cy="926681"/>
+          </a:xfrm>
+          <a:prstGeom prst="rect">
+            <a:avLst/>
+          </a:prstGeom>
+          <a:noFill/>
+          <a:ln>
+            <a:noFill/>
+          </a:ln>
+          <a:extLst>
+            <a:ext uri="{909E8E84-426E-40dd-AFC4-6F175D3DCCD1}">
+              <a14:hiddenFill xmlns="" xmlns:a14="http://schemas.microsoft.com/office/drawing/2010/main">
+                <a:solidFill>
+                  <a:srgbClr val="FFFFFF"/>
+                </a:solidFill>
+              </a14:hiddenFill>
+            </a:ext>
+            <a:ext uri="{91240B29-F687-4f45-9708-019B960494DF}">
+              <a14:hiddenLine xmlns="" xmlns:a14="http://schemas.microsoft.com/office/drawing/2010/main" w="9525">
+                <a:solidFill>
+                  <a:srgbClr val="000000"/>
+                </a:solidFill>
+                <a:miter lim="800000"/>
+                <a:headEnd/>
+                <a:tailEnd/>
+              </a14:hiddenLine>
+            </a:ext>
+          </a:extLst>
+        </p:spPr>
+      </p:pic>
+      <p:sp>
+        <p:nvSpPr>
           <p:cNvPr id="136" name="Shape 136"/>
           <p:cNvSpPr>
             <a:spLocks noChangeArrowheads="1"/>
@@ -14554,30 +14257,21 @@
         </p:nvSpPr>
         <p:spPr bwMode="auto">
           <a:xfrm flipH="1">
-            <a:off x="1472792" y="811218"/>
+            <a:off x="1424024" y="1396434"/>
             <a:ext cx="2377440" cy="640080"/>
           </a:xfrm>
-          <a:prstGeom prst="rect">
+          <a:prstGeom prst="roundRect">
             <a:avLst/>
           </a:prstGeom>
           <a:solidFill>
-            <a:schemeClr val="tx2">
-              <a:lumMod val="20000"/>
-              <a:lumOff val="80000"/>
-            </a:schemeClr>
+            <a:srgbClr val="FFFF00"/>
           </a:solidFill>
-          <a:ln>
+          <a:ln w="12700">
             <a:solidFill>
               <a:srgbClr val="4A7EBB"/>
             </a:solidFill>
           </a:ln>
-          <a:effectLst>
-            <a:outerShdw blurRad="63500" dist="38182" dir="2700000" rotWithShape="0">
-              <a:srgbClr val="000000">
-                <a:alpha val="39999"/>
-              </a:srgbClr>
-            </a:outerShdw>
-          </a:effectLst>
+          <a:effectLst/>
           <a:extLst>
             <a:ext uri="{91240B29-F687-4f45-9708-019B960494DF}">
               <a14:hiddenLine xmlns="" xmlns:a14="http://schemas.microsoft.com/office/drawing/2010/main" w="9525">
@@ -14592,7 +14286,7 @@
           </a:extLst>
         </p:spPr>
         <p:txBody>
-          <a:bodyPr lIns="81638" tIns="42452" rIns="81638" bIns="42452" anchor="ctr"/>
+          <a:bodyPr lIns="0" tIns="0" rIns="0" bIns="0" anchor="ctr"/>
           <a:lstStyle/>
           <a:p>
             <a:pPr algn="ctr" eaLnBrk="1" hangingPunct="1">
@@ -14603,7 +14297,7 @@
               <a:defRPr/>
             </a:pPr>
             <a:r>
-              <a:rPr lang="en-US" sz="1300" i="1" dirty="0">
+              <a:rPr lang="en-US" sz="1300" dirty="0">
                 <a:solidFill>
                   <a:srgbClr val="000000"/>
                 </a:solidFill>
@@ -14612,29 +14306,8 @@
                 <a:cs typeface="PT Sans" charset="-52"/>
                 <a:sym typeface="Arial"/>
               </a:rPr>
-              <a:t>Load a file to </a:t>
-            </a:r>
-            <a:r>
-              <a:rPr lang="en-US" sz="1300" i="1">
-                <a:solidFill>
-                  <a:srgbClr val="000000"/>
-                </a:solidFill>
-                <a:latin typeface="PT Sans" charset="-52"/>
-                <a:ea typeface="PT Sans" charset="-52"/>
-                <a:cs typeface="PT Sans" charset="-52"/>
-                <a:sym typeface="Arial"/>
-              </a:rPr>
-              <a:t>be easily accessible</a:t>
-            </a:r>
-            <a:endParaRPr lang="en-US" sz="1300" i="1" dirty="0">
-              <a:solidFill>
-                <a:srgbClr val="000000"/>
-              </a:solidFill>
-              <a:latin typeface="PT Sans" charset="-52"/>
-              <a:ea typeface="PT Sans" charset="-52"/>
-              <a:cs typeface="PT Sans" charset="-52"/>
-              <a:sym typeface="Arial"/>
-            </a:endParaRPr>
+              <a:t>Load a file to be easily accessible</a:t>
+            </a:r>
           </a:p>
           <a:p>
             <a:pPr algn="ctr" eaLnBrk="1" hangingPunct="1">
@@ -14661,7 +14334,7 @@
       </p:sp>
       <p:sp>
         <p:nvSpPr>
-          <p:cNvPr id="34" name="Rectangle 33"/>
+          <p:cNvPr id="34" name="Rounded Rectangle 33"/>
           <p:cNvSpPr>
             <a:spLocks noChangeArrowheads="1"/>
           </p:cNvSpPr>
@@ -14669,33 +14342,25 @@
         </p:nvSpPr>
         <p:spPr bwMode="auto">
           <a:xfrm>
-            <a:off x="5145298" y="1657588"/>
+            <a:off x="5096530" y="2242804"/>
             <a:ext cx="2560320" cy="457200"/>
           </a:xfrm>
-          <a:prstGeom prst="rect">
+          <a:prstGeom prst="roundRect">
             <a:avLst/>
           </a:prstGeom>
-          <a:solidFill>
-            <a:srgbClr val="FFFF00"/>
-          </a:solidFill>
-          <a:ln w="9525">
+          <a:noFill/>
+          <a:ln w="12700">
             <a:solidFill>
-              <a:srgbClr val="4A7EBB"/>
+              <a:schemeClr val="tx1"/>
             </a:solidFill>
             <a:miter lim="800000"/>
             <a:headEnd/>
             <a:tailEnd/>
           </a:ln>
-          <a:effectLst>
-            <a:outerShdw blurRad="40000" dist="23000" dir="5400000" rotWithShape="0">
-              <a:srgbClr val="000000">
-                <a:alpha val="34999"/>
-              </a:srgbClr>
-            </a:outerShdw>
-          </a:effectLst>
+          <a:effectLst/>
         </p:spPr>
         <p:txBody>
-          <a:bodyPr anchor="ctr"/>
+          <a:bodyPr lIns="0" tIns="0" rIns="0" bIns="0" anchor="ctr"/>
           <a:lstStyle/>
           <a:p>
             <a:pPr algn="ctr" eaLnBrk="1" hangingPunct="1"/>
@@ -14723,7 +14388,7 @@
       </p:sp>
       <p:sp>
         <p:nvSpPr>
-          <p:cNvPr id="35" name="Rectangle 34"/>
+          <p:cNvPr id="35" name="Rounded Rectangle 34"/>
           <p:cNvSpPr>
             <a:spLocks noChangeArrowheads="1"/>
           </p:cNvSpPr>
@@ -14731,33 +14396,25 @@
         </p:nvSpPr>
         <p:spPr bwMode="auto">
           <a:xfrm>
-            <a:off x="5145299" y="147729"/>
+            <a:off x="5096531" y="732945"/>
             <a:ext cx="2560320" cy="457200"/>
           </a:xfrm>
-          <a:prstGeom prst="rect">
+          <a:prstGeom prst="roundRect">
             <a:avLst/>
           </a:prstGeom>
-          <a:solidFill>
-            <a:srgbClr val="FFFF00"/>
-          </a:solidFill>
-          <a:ln w="9525">
+          <a:noFill/>
+          <a:ln w="12700">
             <a:solidFill>
-              <a:srgbClr val="4A7EBB"/>
+              <a:schemeClr val="tx1"/>
             </a:solidFill>
             <a:miter lim="800000"/>
             <a:headEnd/>
             <a:tailEnd/>
           </a:ln>
-          <a:effectLst>
-            <a:outerShdw blurRad="40000" dist="23000" dir="5400000" rotWithShape="0">
-              <a:srgbClr val="000000">
-                <a:alpha val="34999"/>
-              </a:srgbClr>
-            </a:outerShdw>
-          </a:effectLst>
+          <a:effectLst/>
         </p:spPr>
         <p:txBody>
-          <a:bodyPr anchor="ctr"/>
+          <a:bodyPr lIns="0" tIns="0" rIns="0" bIns="0" anchor="ctr"/>
           <a:lstStyle/>
           <a:p>
             <a:pPr algn="ctr" eaLnBrk="1" hangingPunct="1">
@@ -14789,7 +14446,7 @@
       </p:sp>
       <p:sp>
         <p:nvSpPr>
-          <p:cNvPr id="38" name="Rectangle 37"/>
+          <p:cNvPr id="38" name="Rounded Rectangle 37"/>
           <p:cNvSpPr>
             <a:spLocks noChangeArrowheads="1"/>
           </p:cNvSpPr>
@@ -14797,33 +14454,25 @@
         </p:nvSpPr>
         <p:spPr bwMode="auto">
           <a:xfrm>
-            <a:off x="1472794" y="146173"/>
+            <a:off x="1424026" y="731389"/>
             <a:ext cx="2377440" cy="457200"/>
           </a:xfrm>
-          <a:prstGeom prst="rect">
+          <a:prstGeom prst="roundRect">
             <a:avLst/>
           </a:prstGeom>
-          <a:solidFill>
-            <a:srgbClr val="FFFF00"/>
-          </a:solidFill>
-          <a:ln w="9525">
+          <a:noFill/>
+          <a:ln w="12700">
             <a:solidFill>
-              <a:srgbClr val="4A7EBB"/>
+              <a:schemeClr val="tx1"/>
             </a:solidFill>
             <a:miter lim="800000"/>
             <a:headEnd/>
             <a:tailEnd/>
           </a:ln>
-          <a:effectLst>
-            <a:outerShdw blurRad="40000" dist="23000" dir="5400000" rotWithShape="0">
-              <a:srgbClr val="000000">
-                <a:alpha val="34999"/>
-              </a:srgbClr>
-            </a:outerShdw>
-          </a:effectLst>
+          <a:effectLst/>
         </p:spPr>
         <p:txBody>
-          <a:bodyPr anchor="ctr"/>
+          <a:bodyPr lIns="0" tIns="0" rIns="0" bIns="0" anchor="ctr"/>
           <a:lstStyle/>
           <a:p>
             <a:pPr algn="ctr" eaLnBrk="1" hangingPunct="1">
@@ -14863,30 +14512,21 @@
         </p:nvSpPr>
         <p:spPr bwMode="auto">
           <a:xfrm flipH="1">
-            <a:off x="5145298" y="811218"/>
+            <a:off x="5096530" y="1396434"/>
             <a:ext cx="2560320" cy="640080"/>
           </a:xfrm>
-          <a:prstGeom prst="rect">
+          <a:prstGeom prst="roundRect">
             <a:avLst/>
           </a:prstGeom>
           <a:solidFill>
-            <a:schemeClr val="tx2">
-              <a:lumMod val="20000"/>
-              <a:lumOff val="80000"/>
-            </a:schemeClr>
+            <a:srgbClr val="FFFF00"/>
           </a:solidFill>
-          <a:ln>
+          <a:ln w="12700">
             <a:solidFill>
               <a:srgbClr val="4A7EBB"/>
             </a:solidFill>
           </a:ln>
-          <a:effectLst>
-            <a:outerShdw blurRad="63500" dist="38182" dir="2700000" rotWithShape="0">
-              <a:srgbClr val="000000">
-                <a:alpha val="39999"/>
-              </a:srgbClr>
-            </a:outerShdw>
-          </a:effectLst>
+          <a:effectLst/>
           <a:extLst>
             <a:ext uri="{91240B29-F687-4f45-9708-019B960494DF}">
               <a14:hiddenLine xmlns="" xmlns:a14="http://schemas.microsoft.com/office/drawing/2010/main" w="9525">
@@ -14901,7 +14541,7 @@
           </a:extLst>
         </p:spPr>
         <p:txBody>
-          <a:bodyPr lIns="81638" tIns="42452" rIns="81638" bIns="42452" anchor="ctr"/>
+          <a:bodyPr lIns="0" tIns="0" rIns="0" bIns="0" anchor="ctr"/>
           <a:lstStyle/>
           <a:p>
             <a:pPr algn="ctr" eaLnBrk="1" hangingPunct="1">
@@ -14911,7 +14551,7 @@
               <a:buSzPct val="25000"/>
             </a:pPr>
             <a:r>
-              <a:rPr lang="en-US" sz="1300" i="1" dirty="0">
+              <a:rPr lang="en-US" sz="1300" dirty="0">
                 <a:solidFill>
                   <a:srgbClr val="000000"/>
                 </a:solidFill>
@@ -14947,7 +14587,7 @@
       </p:sp>
       <p:sp>
         <p:nvSpPr>
-          <p:cNvPr id="40" name="Rectangle 39"/>
+          <p:cNvPr id="40" name="Rounded Rectangle 39"/>
           <p:cNvSpPr>
             <a:spLocks noChangeArrowheads="1"/>
           </p:cNvSpPr>
@@ -14955,33 +14595,25 @@
         </p:nvSpPr>
         <p:spPr bwMode="auto">
           <a:xfrm>
-            <a:off x="1472793" y="1663063"/>
+            <a:off x="1424025" y="2248279"/>
             <a:ext cx="2377440" cy="457200"/>
           </a:xfrm>
-          <a:prstGeom prst="rect">
+          <a:prstGeom prst="roundRect">
             <a:avLst/>
           </a:prstGeom>
-          <a:solidFill>
-            <a:srgbClr val="FFFF00"/>
-          </a:solidFill>
-          <a:ln w="9525">
+          <a:noFill/>
+          <a:ln w="12700">
             <a:solidFill>
-              <a:srgbClr val="4A7EBB"/>
+              <a:schemeClr val="tx1"/>
             </a:solidFill>
             <a:miter lim="800000"/>
             <a:headEnd/>
             <a:tailEnd/>
           </a:ln>
-          <a:effectLst>
-            <a:outerShdw blurRad="40000" dist="23000" dir="5400000" rotWithShape="0">
-              <a:srgbClr val="000000">
-                <a:alpha val="34999"/>
-              </a:srgbClr>
-            </a:outerShdw>
-          </a:effectLst>
+          <a:effectLst/>
         </p:spPr>
         <p:txBody>
-          <a:bodyPr anchor="ctr"/>
+          <a:bodyPr lIns="0" tIns="0" rIns="0" bIns="0" anchor="ctr"/>
           <a:lstStyle/>
           <a:p>
             <a:pPr algn="ctr" eaLnBrk="1" hangingPunct="1">
@@ -15021,30 +14653,21 @@
         </p:nvSpPr>
         <p:spPr bwMode="auto">
           <a:xfrm flipH="1">
-            <a:off x="192634" y="3031566"/>
+            <a:off x="143866" y="3616782"/>
             <a:ext cx="2560320" cy="640080"/>
           </a:xfrm>
-          <a:prstGeom prst="rect">
+          <a:prstGeom prst="roundRect">
             <a:avLst/>
           </a:prstGeom>
           <a:solidFill>
-            <a:schemeClr val="tx2">
-              <a:lumMod val="20000"/>
-              <a:lumOff val="80000"/>
-            </a:schemeClr>
+            <a:srgbClr val="FFFF00"/>
           </a:solidFill>
-          <a:ln>
+          <a:ln w="12700">
             <a:solidFill>
               <a:srgbClr val="4A7EBB"/>
             </a:solidFill>
           </a:ln>
-          <a:effectLst>
-            <a:outerShdw blurRad="63500" dist="38182" dir="2700000" rotWithShape="0">
-              <a:srgbClr val="000000">
-                <a:alpha val="39999"/>
-              </a:srgbClr>
-            </a:outerShdw>
-          </a:effectLst>
+          <a:effectLst/>
           <a:extLst>
             <a:ext uri="{91240B29-F687-4f45-9708-019B960494DF}">
               <a14:hiddenLine xmlns="" xmlns:a14="http://schemas.microsoft.com/office/drawing/2010/main" w="9525">
@@ -15059,7 +14682,7 @@
           </a:extLst>
         </p:spPr>
         <p:txBody>
-          <a:bodyPr lIns="81638" tIns="42452" rIns="81638" bIns="42452" anchor="ctr"/>
+          <a:bodyPr lIns="0" tIns="0" rIns="0" bIns="0" anchor="ctr"/>
           <a:lstStyle/>
           <a:p>
             <a:pPr algn="ctr" eaLnBrk="1" hangingPunct="1">
@@ -15069,7 +14692,7 @@
               <a:buSzPct val="25000"/>
             </a:pPr>
             <a:r>
-              <a:rPr lang="en-US" sz="1300" i="1" dirty="0">
+              <a:rPr lang="en-US" sz="1300" dirty="0">
                 <a:solidFill>
                   <a:srgbClr val="000000"/>
                 </a:solidFill>
@@ -15103,108 +14726,6 @@
           </a:p>
         </p:txBody>
       </p:sp>
-      <p:sp>
-        <p:nvSpPr>
-          <p:cNvPr id="43" name="Rectangle 42"/>
-          <p:cNvSpPr>
-            <a:spLocks noChangeArrowheads="1"/>
-          </p:cNvSpPr>
-          <p:nvPr/>
-        </p:nvSpPr>
-        <p:spPr bwMode="auto">
-          <a:xfrm>
-            <a:off x="192632" y="3982311"/>
-            <a:ext cx="2560320" cy="457200"/>
-          </a:xfrm>
-          <a:prstGeom prst="rect">
-            <a:avLst/>
-          </a:prstGeom>
-          <a:solidFill>
-            <a:srgbClr val="FFFF00"/>
-          </a:solidFill>
-          <a:ln w="9525">
-            <a:solidFill>
-              <a:srgbClr val="4A7EBB"/>
-            </a:solidFill>
-            <a:miter lim="800000"/>
-            <a:headEnd/>
-            <a:tailEnd/>
-          </a:ln>
-          <a:effectLst>
-            <a:outerShdw blurRad="40000" dist="23000" dir="5400000" rotWithShape="0">
-              <a:srgbClr val="000000">
-                <a:alpha val="34999"/>
-              </a:srgbClr>
-            </a:outerShdw>
-          </a:effectLst>
-        </p:spPr>
-        <p:txBody>
-          <a:bodyPr anchor="ctr"/>
-          <a:lstStyle/>
-          <a:p>
-            <a:pPr algn="ctr" eaLnBrk="1" hangingPunct="1">
-              <a:defRPr/>
-            </a:pPr>
-            <a:r>
-              <a:rPr lang="en-US" sz="1300" dirty="0">
-                <a:latin typeface="PT Sans" charset="-52"/>
-                <a:ea typeface="PT Sans" charset="-52"/>
-                <a:cs typeface="PT Sans" charset="-52"/>
-              </a:rPr>
-              <a:t>Ranked Gene List</a:t>
-            </a:r>
-          </a:p>
-          <a:p>
-            <a:pPr algn="ctr" eaLnBrk="1" hangingPunct="1">
-              <a:defRPr/>
-            </a:pPr>
-            <a:r>
-              <a:rPr lang="en-US" sz="1300" dirty="0">
-                <a:latin typeface="Consolas" charset="0"/>
-                <a:ea typeface="Consolas" charset="0"/>
-                <a:cs typeface="Consolas" charset="0"/>
-              </a:rPr>
-              <a:t>negative_binomial_results</a:t>
-            </a:r>
-          </a:p>
-        </p:txBody>
-      </p:sp>
-      <p:cxnSp>
-        <p:nvCxnSpPr>
-          <p:cNvPr id="4" name="Straight Arrow Connector 3"/>
-          <p:cNvCxnSpPr>
-            <a:stCxn id="42" idx="2"/>
-            <a:endCxn id="43" idx="0"/>
-          </p:cNvCxnSpPr>
-          <p:nvPr/>
-        </p:nvCxnSpPr>
-        <p:spPr>
-          <a:xfrm flipH="1">
-            <a:off x="1472792" y="3671646"/>
-            <a:ext cx="2" cy="310665"/>
-          </a:xfrm>
-          <a:prstGeom prst="straightConnector1">
-            <a:avLst/>
-          </a:prstGeom>
-          <a:ln>
-            <a:tailEnd type="triangle"/>
-          </a:ln>
-        </p:spPr>
-        <p:style>
-          <a:lnRef idx="2">
-            <a:schemeClr val="accent1"/>
-          </a:lnRef>
-          <a:fillRef idx="0">
-            <a:schemeClr val="accent1"/>
-          </a:fillRef>
-          <a:effectRef idx="1">
-            <a:schemeClr val="accent1"/>
-          </a:effectRef>
-          <a:fontRef idx="minor">
-            <a:schemeClr val="tx1"/>
-          </a:fontRef>
-        </p:style>
-      </p:cxnSp>
       <p:sp>
         <p:nvSpPr>
           <p:cNvPr id="44" name="Shape 137"/>
@@ -15215,30 +14736,21 @@
         </p:nvSpPr>
         <p:spPr bwMode="auto">
           <a:xfrm flipH="1">
-            <a:off x="3309046" y="3035153"/>
+            <a:off x="3260278" y="3620369"/>
             <a:ext cx="2560320" cy="640080"/>
           </a:xfrm>
-          <a:prstGeom prst="rect">
+          <a:prstGeom prst="roundRect">
             <a:avLst/>
           </a:prstGeom>
           <a:solidFill>
-            <a:schemeClr val="tx2">
-              <a:lumMod val="20000"/>
-              <a:lumOff val="80000"/>
-            </a:schemeClr>
+            <a:srgbClr val="FFFF00"/>
           </a:solidFill>
-          <a:ln>
+          <a:ln w="12700">
             <a:solidFill>
               <a:srgbClr val="4A7EBB"/>
             </a:solidFill>
           </a:ln>
-          <a:effectLst>
-            <a:outerShdw blurRad="63500" dist="38182" dir="2700000" rotWithShape="0">
-              <a:srgbClr val="000000">
-                <a:alpha val="39999"/>
-              </a:srgbClr>
-            </a:outerShdw>
-          </a:effectLst>
+          <a:effectLst/>
           <a:extLst>
             <a:ext uri="{91240B29-F687-4f45-9708-019B960494DF}">
               <a14:hiddenLine xmlns="" xmlns:a14="http://schemas.microsoft.com/office/drawing/2010/main" w="9525">
@@ -15253,7 +14765,7 @@
           </a:extLst>
         </p:spPr>
         <p:txBody>
-          <a:bodyPr lIns="81638" tIns="42452" rIns="81638" bIns="42452" anchor="ctr"/>
+          <a:bodyPr lIns="0" tIns="0" rIns="0" bIns="0" anchor="ctr"/>
           <a:lstStyle/>
           <a:p>
             <a:pPr algn="ctr" eaLnBrk="1" hangingPunct="1">
@@ -15263,7 +14775,7 @@
               <a:buSzPct val="25000"/>
             </a:pPr>
             <a:r>
-              <a:rPr lang="en-US" sz="1300" i="1" dirty="0">
+              <a:rPr lang="en-US" sz="1300" dirty="0">
                 <a:solidFill>
                   <a:srgbClr val="000000"/>
                 </a:solidFill>
@@ -15297,113 +14809,6 @@
           </a:p>
         </p:txBody>
       </p:sp>
-      <p:sp>
-        <p:nvSpPr>
-          <p:cNvPr id="49" name="Rectangle 48"/>
-          <p:cNvSpPr>
-            <a:spLocks noChangeArrowheads="1"/>
-          </p:cNvSpPr>
-          <p:nvPr/>
-        </p:nvSpPr>
-        <p:spPr bwMode="auto">
-          <a:xfrm>
-            <a:off x="3309046" y="3982311"/>
-            <a:ext cx="2560320" cy="457200"/>
-          </a:xfrm>
-          <a:prstGeom prst="rect">
-            <a:avLst/>
-          </a:prstGeom>
-          <a:solidFill>
-            <a:srgbClr val="FFFF00"/>
-          </a:solidFill>
-          <a:ln w="9525">
-            <a:solidFill>
-              <a:srgbClr val="4A7EBB"/>
-            </a:solidFill>
-            <a:miter lim="800000"/>
-            <a:headEnd/>
-            <a:tailEnd/>
-          </a:ln>
-          <a:effectLst>
-            <a:outerShdw blurRad="40000" dist="23000" dir="5400000" rotWithShape="0">
-              <a:srgbClr val="000000">
-                <a:alpha val="34999"/>
-              </a:srgbClr>
-            </a:outerShdw>
-          </a:effectLst>
-        </p:spPr>
-        <p:txBody>
-          <a:bodyPr anchor="ctr"/>
-          <a:lstStyle/>
-          <a:p>
-            <a:pPr algn="ctr" eaLnBrk="1" hangingPunct="1">
-              <a:defRPr/>
-            </a:pPr>
-            <a:r>
-              <a:rPr lang="en-US" sz="1300" dirty="0">
-                <a:latin typeface="PT Sans" charset="-52"/>
-                <a:ea typeface="PT Sans" charset="-52"/>
-                <a:cs typeface="PT Sans" charset="-52"/>
-              </a:rPr>
-              <a:t>Ranked Gene List</a:t>
-            </a:r>
-          </a:p>
-          <a:p>
-            <a:pPr algn="ctr" eaLnBrk="1" hangingPunct="1">
-              <a:defRPr/>
-            </a:pPr>
-            <a:r>
-              <a:rPr lang="en-US" sz="1300" dirty="0">
-                <a:latin typeface="Consolas" charset="0"/>
-                <a:ea typeface="Consolas" charset="0"/>
-                <a:cs typeface="Consolas" charset="0"/>
-              </a:rPr>
-              <a:t>naive_normal_results</a:t>
-            </a:r>
-            <a:endParaRPr lang="en-US" sz="1300" dirty="0">
-              <a:latin typeface="PT Sans" charset="-52"/>
-              <a:ea typeface="PT Sans" charset="-52"/>
-              <a:cs typeface="PT Sans" charset="-52"/>
-            </a:endParaRPr>
-          </a:p>
-        </p:txBody>
-      </p:sp>
-      <p:cxnSp>
-        <p:nvCxnSpPr>
-          <p:cNvPr id="11" name="Straight Arrow Connector 10"/>
-          <p:cNvCxnSpPr>
-            <a:stCxn id="44" idx="2"/>
-            <a:endCxn id="49" idx="0"/>
-          </p:cNvCxnSpPr>
-          <p:nvPr/>
-        </p:nvCxnSpPr>
-        <p:spPr>
-          <a:xfrm>
-            <a:off x="4589206" y="3675233"/>
-            <a:ext cx="0" cy="307078"/>
-          </a:xfrm>
-          <a:prstGeom prst="straightConnector1">
-            <a:avLst/>
-          </a:prstGeom>
-          <a:ln>
-            <a:tailEnd type="triangle"/>
-          </a:ln>
-        </p:spPr>
-        <p:style>
-          <a:lnRef idx="2">
-            <a:schemeClr val="accent1"/>
-          </a:lnRef>
-          <a:fillRef idx="0">
-            <a:schemeClr val="accent1"/>
-          </a:fillRef>
-          <a:effectRef idx="1">
-            <a:schemeClr val="accent1"/>
-          </a:effectRef>
-          <a:fontRef idx="minor">
-            <a:schemeClr val="tx1"/>
-          </a:fontRef>
-        </p:style>
-      </p:cxnSp>
       <p:sp>
         <p:nvSpPr>
           <p:cNvPr id="57" name="Shape 137"/>
@@ -15414,30 +14819,21 @@
         </p:nvSpPr>
         <p:spPr bwMode="auto">
           <a:xfrm flipH="1">
-            <a:off x="6425657" y="3031566"/>
+            <a:off x="6376889" y="3616782"/>
             <a:ext cx="2560320" cy="640080"/>
           </a:xfrm>
-          <a:prstGeom prst="rect">
+          <a:prstGeom prst="roundRect">
             <a:avLst/>
           </a:prstGeom>
           <a:solidFill>
-            <a:schemeClr val="tx2">
-              <a:lumMod val="20000"/>
-              <a:lumOff val="80000"/>
-            </a:schemeClr>
+            <a:srgbClr val="FFFF00"/>
           </a:solidFill>
-          <a:ln>
+          <a:ln w="12700">
             <a:solidFill>
               <a:srgbClr val="4A7EBB"/>
             </a:solidFill>
           </a:ln>
-          <a:effectLst>
-            <a:outerShdw blurRad="63500" dist="38182" dir="2700000" rotWithShape="0">
-              <a:srgbClr val="000000">
-                <a:alpha val="39999"/>
-              </a:srgbClr>
-            </a:outerShdw>
-          </a:effectLst>
+          <a:effectLst/>
           <a:extLst>
             <a:ext uri="{91240B29-F687-4f45-9708-019B960494DF}">
               <a14:hiddenLine xmlns="" xmlns:a14="http://schemas.microsoft.com/office/drawing/2010/main" w="9525">
@@ -15452,7 +14848,7 @@
           </a:extLst>
         </p:spPr>
         <p:txBody>
-          <a:bodyPr lIns="81638" tIns="42452" rIns="81638" bIns="42452" anchor="ctr"/>
+          <a:bodyPr lIns="0" tIns="0" rIns="0" bIns="0" anchor="ctr"/>
           <a:lstStyle/>
           <a:p>
             <a:pPr algn="ctr" eaLnBrk="1" hangingPunct="1">
@@ -15462,7 +14858,7 @@
               <a:buSzPct val="25000"/>
             </a:pPr>
             <a:r>
-              <a:rPr lang="en-US" sz="1300" i="1" dirty="0">
+              <a:rPr lang="en-US" sz="1300" dirty="0">
                 <a:solidFill>
                   <a:srgbClr val="000000"/>
                 </a:solidFill>
@@ -15498,7 +14894,7 @@
       </p:sp>
       <p:sp>
         <p:nvSpPr>
-          <p:cNvPr id="62" name="Rectangle 61"/>
+          <p:cNvPr id="62" name="Rounded Rectangle 61"/>
           <p:cNvSpPr>
             <a:spLocks noChangeArrowheads="1"/>
           </p:cNvSpPr>
@@ -15506,33 +14902,25 @@
         </p:nvSpPr>
         <p:spPr bwMode="auto">
           <a:xfrm>
-            <a:off x="6425459" y="3988524"/>
+            <a:off x="6376691" y="4573740"/>
             <a:ext cx="2560320" cy="457200"/>
           </a:xfrm>
-          <a:prstGeom prst="rect">
+          <a:prstGeom prst="roundRect">
             <a:avLst/>
           </a:prstGeom>
-          <a:solidFill>
-            <a:srgbClr val="FFFF00"/>
-          </a:solidFill>
-          <a:ln w="9525">
+          <a:noFill/>
+          <a:ln w="12700">
             <a:solidFill>
-              <a:srgbClr val="4A7EBB"/>
+              <a:schemeClr val="tx1"/>
             </a:solidFill>
             <a:miter lim="800000"/>
             <a:headEnd/>
             <a:tailEnd/>
           </a:ln>
-          <a:effectLst>
-            <a:outerShdw blurRad="40000" dist="23000" dir="5400000" rotWithShape="0">
-              <a:srgbClr val="000000">
-                <a:alpha val="34999"/>
-              </a:srgbClr>
-            </a:outerShdw>
-          </a:effectLst>
+          <a:effectLst/>
         </p:spPr>
         <p:txBody>
-          <a:bodyPr anchor="ctr"/>
+          <a:bodyPr lIns="0" tIns="0" rIns="0" bIns="0" anchor="ctr"/>
           <a:lstStyle/>
           <a:p>
             <a:pPr algn="ctr" eaLnBrk="1" hangingPunct="1">
@@ -15593,30 +14981,21 @@
         </p:nvSpPr>
         <p:spPr bwMode="auto">
           <a:xfrm flipH="1">
-            <a:off x="6425459" y="4762602"/>
+            <a:off x="6376691" y="5347818"/>
             <a:ext cx="2560320" cy="640080"/>
           </a:xfrm>
-          <a:prstGeom prst="rect">
+          <a:prstGeom prst="roundRect">
             <a:avLst/>
           </a:prstGeom>
           <a:solidFill>
-            <a:schemeClr val="tx2">
-              <a:lumMod val="20000"/>
-              <a:lumOff val="80000"/>
-            </a:schemeClr>
+            <a:srgbClr val="FFFF00"/>
           </a:solidFill>
-          <a:ln>
+          <a:ln w="12700">
             <a:solidFill>
               <a:srgbClr val="4A7EBB"/>
             </a:solidFill>
           </a:ln>
-          <a:effectLst>
-            <a:outerShdw blurRad="63500" dist="38182" dir="2700000" rotWithShape="0">
-              <a:srgbClr val="000000">
-                <a:alpha val="39999"/>
-              </a:srgbClr>
-            </a:outerShdw>
-          </a:effectLst>
+          <a:effectLst/>
           <a:extLst>
             <a:ext uri="{91240B29-F687-4f45-9708-019B960494DF}">
               <a14:hiddenLine xmlns="" xmlns:a14="http://schemas.microsoft.com/office/drawing/2010/main" w="9525">
@@ -15631,7 +15010,7 @@
           </a:extLst>
         </p:spPr>
         <p:txBody>
-          <a:bodyPr lIns="81638" tIns="42452" rIns="81638" bIns="42452" anchor="ctr"/>
+          <a:bodyPr lIns="0" tIns="0" rIns="0" bIns="0" anchor="ctr"/>
           <a:lstStyle/>
           <a:p>
             <a:pPr algn="ctr" eaLnBrk="1" hangingPunct="1">
@@ -15641,7 +15020,7 @@
               <a:buSzPct val="25000"/>
             </a:pPr>
             <a:r>
-              <a:rPr lang="en-US" sz="1300" i="1" dirty="0">
+              <a:rPr lang="en-US" sz="1300" dirty="0">
                 <a:solidFill>
                   <a:srgbClr val="000000"/>
                 </a:solidFill>
@@ -15675,125 +15054,15 @@
           </a:p>
         </p:txBody>
       </p:sp>
-      <p:sp>
-        <p:nvSpPr>
-          <p:cNvPr id="69" name="Rectangle 68"/>
-          <p:cNvSpPr>
-            <a:spLocks noChangeArrowheads="1"/>
-          </p:cNvSpPr>
-          <p:nvPr/>
-        </p:nvSpPr>
-        <p:spPr bwMode="auto">
-          <a:xfrm>
-            <a:off x="6425459" y="5719559"/>
-            <a:ext cx="2560320" cy="457200"/>
-          </a:xfrm>
-          <a:prstGeom prst="rect">
-            <a:avLst/>
-          </a:prstGeom>
-          <a:solidFill>
-            <a:srgbClr val="FFFF00"/>
-          </a:solidFill>
-          <a:ln w="9525">
-            <a:solidFill>
-              <a:srgbClr val="4A7EBB"/>
-            </a:solidFill>
-            <a:miter lim="800000"/>
-            <a:headEnd/>
-            <a:tailEnd/>
-          </a:ln>
-          <a:effectLst>
-            <a:outerShdw blurRad="40000" dist="23000" dir="5400000" rotWithShape="0">
-              <a:srgbClr val="000000">
-                <a:alpha val="34999"/>
-              </a:srgbClr>
-            </a:outerShdw>
-          </a:effectLst>
-        </p:spPr>
-        <p:txBody>
-          <a:bodyPr anchor="ctr"/>
-          <a:lstStyle/>
-          <a:p>
-            <a:pPr algn="ctr" eaLnBrk="1" hangingPunct="1">
-              <a:defRPr/>
-            </a:pPr>
-            <a:r>
-              <a:rPr lang="en-US" sz="1300" dirty="0">
-                <a:latin typeface="PT Sans" charset="-52"/>
-                <a:ea typeface="PT Sans" charset="-52"/>
-                <a:cs typeface="PT Sans" charset="-52"/>
-              </a:rPr>
-              <a:t>Ranked Gene List</a:t>
-            </a:r>
-          </a:p>
-          <a:p>
-            <a:pPr algn="ctr" eaLnBrk="1" hangingPunct="1">
-              <a:defRPr/>
-            </a:pPr>
-            <a:r>
-              <a:rPr lang="en-US" sz="1300" dirty="0">
-                <a:latin typeface="Consolas" charset="0"/>
-                <a:ea typeface="Consolas" charset="0"/>
-                <a:cs typeface="Consolas" charset="0"/>
-              </a:rPr>
-              <a:t>transformed_normal_results</a:t>
-            </a:r>
-            <a:endParaRPr lang="en-US" sz="1300" dirty="0">
-              <a:latin typeface="PT Sans" charset="-52"/>
-              <a:ea typeface="PT Sans" charset="-52"/>
-              <a:cs typeface="PT Sans" charset="-52"/>
-            </a:endParaRPr>
-          </a:p>
-        </p:txBody>
-      </p:sp>
       <p:cxnSp>
         <p:nvCxnSpPr>
-          <p:cNvPr id="70" name="Straight Arrow Connector 69"/>
-          <p:cNvCxnSpPr>
-            <a:stCxn id="68" idx="2"/>
-            <a:endCxn id="69" idx="0"/>
-          </p:cNvCxnSpPr>
+          <p:cNvPr id="24" name="Straight Arrow Connector 23"/>
+          <p:cNvCxnSpPr/>
           <p:nvPr/>
         </p:nvCxnSpPr>
         <p:spPr>
           <a:xfrm>
-            <a:off x="7705619" y="5402682"/>
-            <a:ext cx="0" cy="316877"/>
-          </a:xfrm>
-          <a:prstGeom prst="straightConnector1">
-            <a:avLst/>
-          </a:prstGeom>
-          <a:ln>
-            <a:tailEnd type="triangle"/>
-          </a:ln>
-        </p:spPr>
-        <p:style>
-          <a:lnRef idx="2">
-            <a:schemeClr val="accent1"/>
-          </a:lnRef>
-          <a:fillRef idx="0">
-            <a:schemeClr val="accent1"/>
-          </a:fillRef>
-          <a:effectRef idx="1">
-            <a:schemeClr val="accent1"/>
-          </a:effectRef>
-          <a:fontRef idx="minor">
-            <a:schemeClr val="tx1"/>
-          </a:fontRef>
-        </p:style>
-      </p:cxnSp>
-      <p:cxnSp>
-        <p:nvCxnSpPr>
-          <p:cNvPr id="24" name="Straight Arrow Connector 23"/>
-          <p:cNvCxnSpPr>
-            <a:stCxn id="62" idx="2"/>
-            <a:endCxn id="68" idx="0"/>
-          </p:cNvCxnSpPr>
-          <p:nvPr/>
-        </p:nvCxnSpPr>
-        <p:spPr>
-          <a:xfrm>
-            <a:off x="7705619" y="4445724"/>
+            <a:off x="7656851" y="5030940"/>
             <a:ext cx="0" cy="316878"/>
           </a:xfrm>
           <a:prstGeom prst="straightConnector1">
@@ -15802,6 +15071,7 @@
           <a:ln w="63500" cmpd="dbl">
             <a:tailEnd type="triangle"/>
           </a:ln>
+          <a:effectLst/>
         </p:spPr>
         <p:style>
           <a:lnRef idx="2">
@@ -15821,15 +15091,12 @@
       <p:cxnSp>
         <p:nvCxnSpPr>
           <p:cNvPr id="28" name="Straight Arrow Connector 27"/>
-          <p:cNvCxnSpPr>
-            <a:stCxn id="57" idx="2"/>
-            <a:endCxn id="62" idx="0"/>
-          </p:cNvCxnSpPr>
+          <p:cNvCxnSpPr/>
           <p:nvPr/>
         </p:nvCxnSpPr>
         <p:spPr>
           <a:xfrm flipH="1">
-            <a:off x="7705619" y="3671646"/>
+            <a:off x="7656851" y="4256862"/>
             <a:ext cx="198" cy="316878"/>
           </a:xfrm>
           <a:prstGeom prst="straightConnector1">
@@ -15838,6 +15105,7 @@
           <a:ln w="63500" cmpd="dbl">
             <a:tailEnd type="triangle"/>
           </a:ln>
+          <a:effectLst/>
         </p:spPr>
         <p:style>
           <a:lnRef idx="2">
@@ -15862,12 +15130,13 @@
         </p:nvSpPr>
         <p:spPr>
           <a:xfrm>
-            <a:off x="4467647" y="2117069"/>
+            <a:off x="4418879" y="2702285"/>
             <a:ext cx="243118" cy="245533"/>
           </a:xfrm>
           <a:prstGeom prst="ellipse">
             <a:avLst/>
           </a:prstGeom>
+          <a:effectLst/>
         </p:spPr>
         <p:style>
           <a:lnRef idx="1">
@@ -15906,14 +15175,13 @@
         <p:nvCxnSpPr>
           <p:cNvPr id="45" name="Elbow Connector 44"/>
           <p:cNvCxnSpPr>
-            <a:stCxn id="34" idx="2"/>
             <a:endCxn id="32" idx="6"/>
           </p:cNvCxnSpPr>
           <p:nvPr/>
         </p:nvCxnSpPr>
         <p:spPr>
           <a:xfrm rot="5400000">
-            <a:off x="5505588" y="1319966"/>
+            <a:off x="5456820" y="1905182"/>
             <a:ext cx="125048" cy="1714693"/>
           </a:xfrm>
           <a:prstGeom prst="bentConnector2">
@@ -15922,6 +15190,7 @@
           <a:ln>
             <a:tailEnd type="triangle"/>
           </a:ln>
+          <a:effectLst/>
         </p:spPr>
         <p:style>
           <a:lnRef idx="2">
@@ -15942,14 +15211,13 @@
         <p:nvCxnSpPr>
           <p:cNvPr id="48" name="Elbow Connector 47"/>
           <p:cNvCxnSpPr>
-            <a:stCxn id="40" idx="2"/>
             <a:endCxn id="32" idx="2"/>
           </p:cNvCxnSpPr>
           <p:nvPr/>
         </p:nvCxnSpPr>
         <p:spPr>
           <a:xfrm rot="16200000" flipH="1">
-            <a:off x="3504794" y="1276982"/>
+            <a:off x="3456026" y="1862198"/>
             <a:ext cx="119573" cy="1806134"/>
           </a:xfrm>
           <a:prstGeom prst="bentConnector2">
@@ -15958,6 +15226,7 @@
           <a:ln>
             <a:tailEnd type="triangle"/>
           </a:ln>
+          <a:effectLst/>
         </p:spPr>
         <p:style>
           <a:lnRef idx="2">
@@ -15977,15 +15246,12 @@
       <p:cxnSp>
         <p:nvCxnSpPr>
           <p:cNvPr id="63" name="Straight Arrow Connector 62"/>
-          <p:cNvCxnSpPr>
-            <a:stCxn id="38" idx="2"/>
-            <a:endCxn id="136" idx="0"/>
-          </p:cNvCxnSpPr>
+          <p:cNvCxnSpPr/>
           <p:nvPr/>
         </p:nvCxnSpPr>
         <p:spPr>
           <a:xfrm flipH="1">
-            <a:off x="2661512" y="603373"/>
+            <a:off x="2612744" y="1188589"/>
             <a:ext cx="2" cy="207845"/>
           </a:xfrm>
           <a:prstGeom prst="straightConnector1">
@@ -15994,6 +15260,7 @@
           <a:ln>
             <a:tailEnd type="triangle"/>
           </a:ln>
+          <a:effectLst/>
         </p:spPr>
         <p:style>
           <a:lnRef idx="2">
@@ -16013,15 +15280,12 @@
       <p:cxnSp>
         <p:nvCxnSpPr>
           <p:cNvPr id="11265" name="Straight Arrow Connector 11264"/>
-          <p:cNvCxnSpPr>
-            <a:stCxn id="136" idx="2"/>
-            <a:endCxn id="40" idx="0"/>
-          </p:cNvCxnSpPr>
+          <p:cNvCxnSpPr/>
           <p:nvPr/>
         </p:nvCxnSpPr>
         <p:spPr>
           <a:xfrm>
-            <a:off x="2661512" y="1451298"/>
+            <a:off x="2612744" y="2036514"/>
             <a:ext cx="1" cy="211765"/>
           </a:xfrm>
           <a:prstGeom prst="straightConnector1">
@@ -16030,6 +15294,7 @@
           <a:ln>
             <a:tailEnd type="triangle"/>
           </a:ln>
+          <a:effectLst/>
         </p:spPr>
         <p:style>
           <a:lnRef idx="2">
@@ -16049,15 +15314,12 @@
       <p:cxnSp>
         <p:nvCxnSpPr>
           <p:cNvPr id="11272" name="Straight Arrow Connector 11271"/>
-          <p:cNvCxnSpPr>
-            <a:stCxn id="35" idx="2"/>
-            <a:endCxn id="39" idx="0"/>
-          </p:cNvCxnSpPr>
+          <p:cNvCxnSpPr/>
           <p:nvPr/>
         </p:nvCxnSpPr>
         <p:spPr>
           <a:xfrm flipH="1">
-            <a:off x="6425458" y="604929"/>
+            <a:off x="6376690" y="1190145"/>
             <a:ext cx="1" cy="206289"/>
           </a:xfrm>
           <a:prstGeom prst="straightConnector1">
@@ -16066,6 +15328,7 @@
           <a:ln>
             <a:tailEnd type="triangle"/>
           </a:ln>
+          <a:effectLst/>
         </p:spPr>
         <p:style>
           <a:lnRef idx="2">
@@ -16085,15 +15348,12 @@
       <p:cxnSp>
         <p:nvCxnSpPr>
           <p:cNvPr id="11274" name="Straight Arrow Connector 11273"/>
-          <p:cNvCxnSpPr>
-            <a:stCxn id="39" idx="2"/>
-            <a:endCxn id="34" idx="0"/>
-          </p:cNvCxnSpPr>
+          <p:cNvCxnSpPr/>
           <p:nvPr/>
         </p:nvCxnSpPr>
         <p:spPr>
           <a:xfrm>
-            <a:off x="6425458" y="1451298"/>
+            <a:off x="6376690" y="2036514"/>
             <a:ext cx="0" cy="206290"/>
           </a:xfrm>
           <a:prstGeom prst="straightConnector1">
@@ -16102,6 +15362,7 @@
           <a:ln>
             <a:tailEnd type="triangle"/>
           </a:ln>
+          <a:effectLst/>
         </p:spPr>
         <p:style>
           <a:lnRef idx="2">
@@ -16123,13 +15384,12 @@
           <p:cNvPr id="168" name="Elbow Connector 167"/>
           <p:cNvCxnSpPr>
             <a:stCxn id="32" idx="4"/>
-            <a:endCxn id="42" idx="0"/>
           </p:cNvCxnSpPr>
           <p:nvPr/>
         </p:nvCxnSpPr>
         <p:spPr>
           <a:xfrm rot="5400000">
-            <a:off x="2696518" y="1138878"/>
+            <a:off x="2647750" y="1724094"/>
             <a:ext cx="668964" cy="3116412"/>
           </a:xfrm>
           <a:prstGeom prst="bentConnector3">
@@ -16140,6 +15400,7 @@
           <a:ln w="63500" cmpd="dbl">
             <a:tailEnd type="triangle"/>
           </a:ln>
+          <a:effectLst/>
         </p:spPr>
         <p:style>
           <a:lnRef idx="2">
@@ -16161,13 +15422,12 @@
           <p:cNvPr id="170" name="Elbow Connector 169"/>
           <p:cNvCxnSpPr>
             <a:stCxn id="32" idx="4"/>
-            <a:endCxn id="57" idx="0"/>
           </p:cNvCxnSpPr>
           <p:nvPr/>
         </p:nvCxnSpPr>
         <p:spPr>
           <a:xfrm rot="16200000" flipH="1">
-            <a:off x="5813029" y="1138778"/>
+            <a:off x="5764261" y="1723994"/>
             <a:ext cx="668964" cy="3116611"/>
           </a:xfrm>
           <a:prstGeom prst="bentConnector3">
@@ -16178,6 +15438,7 @@
           <a:ln w="63500" cmpd="dbl">
             <a:tailEnd type="triangle"/>
           </a:ln>
+          <a:effectLst/>
         </p:spPr>
         <p:style>
           <a:lnRef idx="2">
@@ -16199,13 +15460,12 @@
           <p:cNvPr id="11335" name="Straight Arrow Connector 11334"/>
           <p:cNvCxnSpPr>
             <a:stCxn id="32" idx="4"/>
-            <a:endCxn id="44" idx="0"/>
           </p:cNvCxnSpPr>
           <p:nvPr/>
         </p:nvCxnSpPr>
         <p:spPr>
           <a:xfrm>
-            <a:off x="4589206" y="2362602"/>
+            <a:off x="4540438" y="2947818"/>
             <a:ext cx="0" cy="672551"/>
           </a:xfrm>
           <a:prstGeom prst="straightConnector1">
@@ -16214,6 +15474,7 @@
           <a:ln w="63500" cmpd="dbl">
             <a:tailEnd type="triangle"/>
           </a:ln>
+          <a:effectLst/>
         </p:spPr>
         <p:style>
           <a:lnRef idx="2">
@@ -16232,7 +15493,13 @@
       </p:cxnSp>
       <p:sp>
         <p:nvSpPr>
-          <p:cNvPr id="36" name="Rectangle 35"/>
+          <p:cNvPr id="54" name="Rounded Rectangle 53">
+            <a:extLst>
+              <a:ext uri="{FF2B5EF4-FFF2-40B4-BE49-F238E27FC236}">
+                <a16:creationId xmlns:a16="http://schemas.microsoft.com/office/drawing/2014/main" id="{841C45CD-A69B-D946-A964-2B661650E8C8}"/>
+              </a:ext>
+            </a:extLst>
+          </p:cNvPr>
           <p:cNvSpPr>
             <a:spLocks noChangeArrowheads="1"/>
           </p:cNvSpPr>
@@ -16243,7 +15510,7 @@
             <a:off x="192632" y="4767140"/>
             <a:ext cx="2728986" cy="640080"/>
           </a:xfrm>
-          <a:prstGeom prst="rect">
+          <a:prstGeom prst="roundRect">
             <a:avLst/>
           </a:prstGeom>
           <a:solidFill>
@@ -16262,23 +15529,17 @@
             <a:headEnd/>
             <a:tailEnd/>
           </a:ln>
-          <a:effectLst>
-            <a:outerShdw blurRad="40000" dist="23000" dir="5400000" rotWithShape="0">
-              <a:srgbClr val="000000">
-                <a:alpha val="34999"/>
-              </a:srgbClr>
-            </a:outerShdw>
-          </a:effectLst>
+          <a:effectLst/>
         </p:spPr>
         <p:txBody>
-          <a:bodyPr anchor="ctr"/>
+          <a:bodyPr lIns="0" tIns="0" rIns="0" bIns="0" anchor="ctr"/>
           <a:lstStyle/>
           <a:p>
             <a:pPr algn="ctr" eaLnBrk="1" hangingPunct="1">
               <a:defRPr/>
             </a:pPr>
             <a:r>
-              <a:rPr lang="en-US" sz="1300" i="1" dirty="0">
+              <a:rPr lang="en-US" sz="1300" dirty="0">
                 <a:latin typeface="PT Sans" charset="-52"/>
                 <a:ea typeface="PT Sans" charset="-52"/>
                 <a:cs typeface="PT Sans" charset="-52"/>
@@ -16303,7 +15564,13 @@
       </p:sp>
       <p:sp>
         <p:nvSpPr>
-          <p:cNvPr id="47" name="Rectangle 46"/>
+          <p:cNvPr id="55" name="Rounded Rectangle 54">
+            <a:extLst>
+              <a:ext uri="{FF2B5EF4-FFF2-40B4-BE49-F238E27FC236}">
+                <a16:creationId xmlns:a16="http://schemas.microsoft.com/office/drawing/2014/main" id="{47CED92E-85EF-EB44-8B32-65200EE350A0}"/>
+              </a:ext>
+            </a:extLst>
+          </p:cNvPr>
           <p:cNvSpPr>
             <a:spLocks noChangeArrowheads="1"/>
           </p:cNvSpPr>
@@ -16314,7 +15581,7 @@
             <a:off x="192632" y="5632657"/>
             <a:ext cx="2728986" cy="640080"/>
           </a:xfrm>
-          <a:prstGeom prst="rect">
+          <a:prstGeom prst="roundRect">
             <a:avLst/>
           </a:prstGeom>
           <a:solidFill>
@@ -16333,23 +15600,17 @@
             <a:headEnd/>
             <a:tailEnd/>
           </a:ln>
-          <a:effectLst>
-            <a:outerShdw blurRad="40000" dist="23000" dir="5400000" rotWithShape="0">
-              <a:srgbClr val="000000">
-                <a:alpha val="34999"/>
-              </a:srgbClr>
-            </a:outerShdw>
-          </a:effectLst>
+          <a:effectLst/>
         </p:spPr>
         <p:txBody>
-          <a:bodyPr anchor="ctr"/>
+          <a:bodyPr lIns="0" tIns="0" rIns="0" bIns="0" anchor="ctr"/>
           <a:lstStyle/>
           <a:p>
             <a:pPr algn="ctr" eaLnBrk="1" hangingPunct="1">
               <a:defRPr/>
             </a:pPr>
             <a:r>
-              <a:rPr lang="en-US" sz="1300" i="1" dirty="0">
+              <a:rPr lang="en-US" sz="1300" dirty="0">
                 <a:latin typeface="PT Sans" charset="-52"/>
                 <a:ea typeface="PT Sans" charset="-52"/>
                 <a:cs typeface="PT Sans" charset="-52"/>
@@ -16374,20 +15635,28 @@
       </p:sp>
       <p:cxnSp>
         <p:nvCxnSpPr>
-          <p:cNvPr id="21" name="Elbow Connector 20"/>
+          <p:cNvPr id="56" name="Elbow Connector 55">
+            <a:extLst>
+              <a:ext uri="{FF2B5EF4-FFF2-40B4-BE49-F238E27FC236}">
+                <a16:creationId xmlns:a16="http://schemas.microsoft.com/office/drawing/2014/main" id="{164A02DB-CA73-6245-B208-CAB71C1C63C6}"/>
+              </a:ext>
+            </a:extLst>
+          </p:cNvPr>
           <p:cNvCxnSpPr>
-            <a:stCxn id="69" idx="1"/>
-            <a:endCxn id="36" idx="3"/>
+            <a:cxnSpLocks/>
+            <a:stCxn id="68" idx="3"/>
           </p:cNvCxnSpPr>
           <p:nvPr/>
         </p:nvCxnSpPr>
         <p:spPr>
           <a:xfrm rot="10800000">
-            <a:off x="2921619" y="5087181"/>
-            <a:ext cx="3503841" cy="860979"/>
+            <a:off x="2921619" y="5087182"/>
+            <a:ext cx="3455072" cy="580677"/>
           </a:xfrm>
           <a:prstGeom prst="bentConnector3">
-            <a:avLst/>
+            <a:avLst>
+              <a:gd name="adj1" fmla="val 50000"/>
+            </a:avLst>
           </a:prstGeom>
           <a:ln w="50800">
             <a:solidFill>
@@ -16397,6 +15666,7 @@
             </a:solidFill>
             <a:tailEnd type="triangle"/>
           </a:ln>
+          <a:effectLst/>
         </p:spPr>
         <p:style>
           <a:lnRef idx="2">
@@ -16415,20 +15685,28 @@
       </p:cxnSp>
       <p:cxnSp>
         <p:nvCxnSpPr>
-          <p:cNvPr id="23" name="Elbow Connector 22"/>
+          <p:cNvPr id="58" name="Elbow Connector 57">
+            <a:extLst>
+              <a:ext uri="{FF2B5EF4-FFF2-40B4-BE49-F238E27FC236}">
+                <a16:creationId xmlns:a16="http://schemas.microsoft.com/office/drawing/2014/main" id="{F672C35D-277D-9540-867A-C7E009E27204}"/>
+              </a:ext>
+            </a:extLst>
+          </p:cNvPr>
           <p:cNvCxnSpPr>
-            <a:stCxn id="69" idx="1"/>
-            <a:endCxn id="47" idx="3"/>
+            <a:cxnSpLocks/>
+            <a:stCxn id="68" idx="3"/>
           </p:cNvCxnSpPr>
           <p:nvPr/>
         </p:nvCxnSpPr>
         <p:spPr>
           <a:xfrm rot="10800000" flipV="1">
-            <a:off x="2921619" y="5948159"/>
-            <a:ext cx="3503841" cy="4538"/>
+            <a:off x="2921621" y="5667858"/>
+            <a:ext cx="3455071" cy="284838"/>
           </a:xfrm>
           <a:prstGeom prst="bentConnector3">
-            <a:avLst/>
+            <a:avLst>
+              <a:gd name="adj1" fmla="val 50000"/>
+            </a:avLst>
           </a:prstGeom>
           <a:ln w="50800">
             <a:solidFill>
@@ -16456,19 +15734,26 @@
       </p:cxnSp>
       <p:sp>
         <p:nvSpPr>
-          <p:cNvPr id="27" name="TextBox 26"/>
+          <p:cNvPr id="59" name="TextBox 58">
+            <a:extLst>
+              <a:ext uri="{FF2B5EF4-FFF2-40B4-BE49-F238E27FC236}">
+                <a16:creationId xmlns:a16="http://schemas.microsoft.com/office/drawing/2014/main" id="{8C19F604-CA13-2948-A794-294918ACB4BA}"/>
+              </a:ext>
+            </a:extLst>
+          </p:cNvPr>
           <p:cNvSpPr txBox="1"/>
           <p:nvPr/>
         </p:nvSpPr>
         <p:spPr>
           <a:xfrm>
-            <a:off x="4988811" y="5392410"/>
+            <a:off x="4710765" y="4821032"/>
             <a:ext cx="1158601" cy="523220"/>
           </a:xfrm>
           <a:prstGeom prst="rect">
             <a:avLst/>
           </a:prstGeom>
           <a:noFill/>
+          <a:effectLst/>
         </p:spPr>
         <p:txBody>
           <a:bodyPr wrap="square" rtlCol="0">
@@ -16495,7 +15780,7 @@
     </p:spTree>
     <p:extLst>
       <p:ext uri="{BB962C8B-B14F-4D97-AF65-F5344CB8AC3E}">
-        <p14:creationId xmlns:p14="http://schemas.microsoft.com/office/powerpoint/2010/main" val="935889203"/>
+        <p14:creationId xmlns:p14="http://schemas.microsoft.com/office/powerpoint/2010/main" val="3451055509"/>
       </p:ext>
     </p:extLst>
   </p:cSld>

</xml_diff>